<commit_message>
Sum chnges to pptx needs to be done
</commit_message>
<xml_diff>
--- a/docs/Result/Презентация.pptx
+++ b/docs/Result/Презентация.pptx
@@ -4252,8 +4252,8 @@
         </p:nvSpPr>
         <p:spPr>
           <a:xfrm>
-            <a:off x="457199" y="1371600"/>
-            <a:ext cx="6939887" cy="1035720"/>
+            <a:off x="457199" y="1899424"/>
+            <a:ext cx="7296616" cy="1035720"/>
           </a:xfrm>
           <a:prstGeom prst="rect">
             <a:avLst/>
@@ -4269,7 +4269,7 @@
           </a:bodyPr>
           <a:lstStyle/>
           <a:p>
-            <a:pPr>
+            <a:pPr algn="ctr">
               <a:lnSpc>
                 <a:spcPct val="100000"/>
               </a:lnSpc>
@@ -4284,7 +4284,7 @@
               </a:tabLst>
             </a:pPr>
             <a:r>
-              <a:rPr lang="en-US" sz="2000" b="1" u="none" strike="noStrike" dirty="0" err="1">
+              <a:rPr lang="en-US" sz="2400" b="1" u="none" strike="noStrike" dirty="0" err="1">
                 <a:solidFill>
                   <a:srgbClr val="666666"/>
                 </a:solidFill>
@@ -4296,7 +4296,7 @@
               <a:t>Выпускная</a:t>
             </a:r>
             <a:r>
-              <a:rPr lang="en-US" sz="2000" b="1" u="none" strike="noStrike" dirty="0">
+              <a:rPr lang="en-US" sz="2400" b="1" u="none" strike="noStrike" dirty="0">
                 <a:solidFill>
                   <a:srgbClr val="666666"/>
                 </a:solidFill>
@@ -4308,7 +4308,7 @@
               <a:t> </a:t>
             </a:r>
             <a:r>
-              <a:rPr lang="en-US" sz="2000" b="1" u="none" strike="noStrike" dirty="0" err="1">
+              <a:rPr lang="en-US" sz="2400" b="1" u="none" strike="noStrike" dirty="0" err="1">
                 <a:solidFill>
                   <a:srgbClr val="666666"/>
                 </a:solidFill>
@@ -4320,7 +4320,7 @@
               <a:t>квалификационная</a:t>
             </a:r>
             <a:r>
-              <a:rPr lang="en-US" sz="2000" b="1" u="none" strike="noStrike" dirty="0">
+              <a:rPr lang="en-US" sz="2400" b="1" u="none" strike="noStrike" dirty="0">
                 <a:solidFill>
                   <a:srgbClr val="666666"/>
                 </a:solidFill>
@@ -4332,7 +4332,7 @@
               <a:t> </a:t>
             </a:r>
             <a:r>
-              <a:rPr lang="en-US" sz="2000" b="1" u="none" strike="noStrike" dirty="0" err="1">
+              <a:rPr lang="en-US" sz="2400" b="1" u="none" strike="noStrike" dirty="0" err="1">
                 <a:solidFill>
                   <a:srgbClr val="666666"/>
                 </a:solidFill>
@@ -4344,7 +4344,7 @@
               <a:t>работа</a:t>
             </a:r>
             <a:r>
-              <a:rPr lang="en-US" sz="2000" b="1" u="none" strike="noStrike" dirty="0">
+              <a:rPr lang="en-US" sz="2400" b="1" u="none" strike="noStrike" dirty="0">
                 <a:solidFill>
                   <a:srgbClr val="666666"/>
                 </a:solidFill>
@@ -4356,7 +4356,7 @@
               <a:t> </a:t>
             </a:r>
             <a:r>
-              <a:rPr lang="en-US" sz="2000" b="1" u="none" strike="noStrike" dirty="0" err="1">
+              <a:rPr lang="en-US" sz="2400" b="1" u="none" strike="noStrike" dirty="0" err="1">
                 <a:solidFill>
                   <a:srgbClr val="666666"/>
                 </a:solidFill>
@@ -4368,7 +4368,7 @@
               <a:t>на</a:t>
             </a:r>
             <a:r>
-              <a:rPr lang="en-US" sz="2000" b="1" u="none" strike="noStrike" dirty="0">
+              <a:rPr lang="en-US" sz="2400" b="1" u="none" strike="noStrike" dirty="0">
                 <a:solidFill>
                   <a:srgbClr val="666666"/>
                 </a:solidFill>
@@ -4380,7 +4380,7 @@
               <a:t> </a:t>
             </a:r>
             <a:r>
-              <a:rPr lang="en-US" sz="2000" b="1" u="none" strike="noStrike" dirty="0" err="1">
+              <a:rPr lang="en-US" sz="2400" b="1" u="none" strike="noStrike" dirty="0" err="1">
                 <a:solidFill>
                   <a:srgbClr val="666666"/>
                 </a:solidFill>
@@ -4392,7 +4392,7 @@
               <a:t>тему</a:t>
             </a:r>
             <a:r>
-              <a:rPr lang="en-US" sz="2000" b="1" u="none" strike="noStrike" dirty="0">
+              <a:rPr lang="en-US" sz="2400" b="1" u="none" strike="noStrike" dirty="0">
                 <a:solidFill>
                   <a:srgbClr val="666666"/>
                 </a:solidFill>
@@ -4404,47 +4404,35 @@
               <a:t>:</a:t>
             </a:r>
             <a:br>
-              <a:rPr sz="2000" dirty="0"/>
+              <a:rPr sz="2400" dirty="0"/>
             </a:br>
             <a:r>
-              <a:rPr lang="en-US" sz="2000" b="1" u="none" strike="noStrike" dirty="0">
+              <a:rPr lang="ru-RU" sz="2400" b="1" dirty="0">
                 <a:solidFill>
                   <a:srgbClr val="666666"/>
                 </a:solidFill>
-                <a:effectLst/>
-                <a:uFillTx/>
-                <a:latin typeface="Arial"/>
-                <a:ea typeface="Arial"/>
-              </a:rPr>
-              <a:t>«</a:t>
-            </a:r>
-            <a:r>
-              <a:rPr lang="ru-RU" sz="2000" b="1" dirty="0">
+                <a:ea typeface="Arial"/>
+              </a:rPr>
+              <a:t>«Разработка многопользовательской</a:t>
+            </a:r>
+            <a:br>
+              <a:rPr lang="ru-RU" sz="2400" b="1" dirty="0">
                 <a:solidFill>
                   <a:srgbClr val="666666"/>
                 </a:solidFill>
                 <a:ea typeface="Arial"/>
               </a:rPr>
-              <a:t>«Разработка многопользовательской</a:t>
-            </a:r>
-            <a:br>
-              <a:rPr lang="ru-RU" sz="2000" b="1" dirty="0">
+            </a:br>
+            <a:r>
+              <a:rPr lang="ru-RU" sz="2400" b="1" dirty="0">
                 <a:solidFill>
                   <a:srgbClr val="666666"/>
                 </a:solidFill>
                 <a:ea typeface="Arial"/>
               </a:rPr>
-            </a:br>
-            <a:r>
-              <a:rPr lang="ru-RU" sz="2000" b="1" dirty="0">
-                <a:solidFill>
-                  <a:srgbClr val="666666"/>
-                </a:solidFill>
-                <a:ea typeface="Arial"/>
-              </a:rPr>
               <a:t>компьютерной игры в жанре RTS «Боярский турнир»</a:t>
             </a:r>
-            <a:endParaRPr lang="en-US" sz="2000" b="0" u="none" strike="noStrike" dirty="0">
+            <a:endParaRPr lang="en-US" sz="2400" b="0" u="none" strike="noStrike" dirty="0">
               <a:solidFill>
                 <a:srgbClr val="000000"/>
               </a:solidFill>
@@ -4531,7 +4519,7 @@
         </p:nvSpPr>
         <p:spPr>
           <a:xfrm>
-            <a:off x="457200" y="2848680"/>
+            <a:off x="457199" y="3175783"/>
             <a:ext cx="6266520" cy="1035720"/>
           </a:xfrm>
           <a:prstGeom prst="rect">
@@ -5917,15 +5905,15 @@
             <a:r>
               <a:rPr lang="ru-RU" sz="2400" b="1" dirty="0">
                 <a:solidFill>
-                  <a:srgbClr val="FF9400"/>
-                </a:solidFill>
-                <a:ea typeface="Arial"/>
-              </a:rPr>
-              <a:t>Сетевое исследование</a:t>
+                  <a:srgbClr val="FF0000"/>
+                </a:solidFill>
+                <a:ea typeface="Arial"/>
+              </a:rPr>
+              <a:t>Сетевое исследование нагрузки на сеть</a:t>
             </a:r>
             <a:endParaRPr lang="en-US" sz="2400" b="0" u="none" strike="noStrike" dirty="0">
               <a:solidFill>
-                <a:srgbClr val="000000"/>
+                <a:srgbClr val="FF0000"/>
               </a:solidFill>
               <a:effectLst/>
               <a:uFillTx/>
@@ -7637,7 +7625,7 @@
                 </a:solidFill>
                 <a:latin typeface="Arial"/>
               </a:rPr>
-              <a:t>Основные проблемы </a:t>
+              <a:t>Основные проблемы протокола </a:t>
             </a:r>
             <a:r>
               <a:rPr lang="en-US" sz="2400" b="1" dirty="0">
@@ -8339,7 +8327,7 @@
             <a:r>
               <a:rPr lang="ru-RU" sz="2400" b="1" dirty="0">
                 <a:solidFill>
-                  <a:srgbClr val="FF9400"/>
+                  <a:srgbClr val="FF0000"/>
                 </a:solidFill>
                 <a:latin typeface="Arial"/>
               </a:rPr>
@@ -8347,7 +8335,7 @@
             </a:r>
             <a:endParaRPr lang="en-US" sz="2400" b="0" u="none" strike="noStrike" dirty="0">
               <a:solidFill>
-                <a:srgbClr val="000000"/>
+                <a:srgbClr val="FF0000"/>
               </a:solidFill>
               <a:effectLst/>
               <a:uFillTx/>
@@ -8540,11 +8528,20 @@
             <a:r>
               <a:rPr lang="ru-RU" sz="2000" dirty="0">
                 <a:solidFill>
+                  <a:srgbClr val="FF0000"/>
+                </a:solidFill>
+                <a:ea typeface="Arial"/>
+              </a:rPr>
+              <a:t>многопользовательская</a:t>
+            </a:r>
+            <a:r>
+              <a:rPr lang="ru-RU" sz="2000" dirty="0">
+                <a:solidFill>
                   <a:srgbClr val="4D4E4F"/>
                 </a:solidFill>
                 <a:ea typeface="Arial"/>
               </a:rPr>
-              <a:t>многопользовательская мобильная стратегия с клиент-серверной архитектурой</a:t>
+              <a:t> мобильная стратегия с клиент-серверной архитектурой</a:t>
             </a:r>
             <a:r>
               <a:rPr lang="ru" sz="2000" b="0" u="none" strike="noStrike" dirty="0">
@@ -9447,7 +9444,43 @@
                 <a:latin typeface="Arial"/>
                 <a:ea typeface="Arial"/>
               </a:rPr>
-              <a:t>Инструментарий;</a:t>
+              <a:t>Инструментарий (</a:t>
+            </a:r>
+            <a:r>
+              <a:rPr lang="ru-RU" sz="2000" b="0" u="none" strike="noStrike" dirty="0">
+                <a:solidFill>
+                  <a:srgbClr val="4D4E4F"/>
+                </a:solidFill>
+                <a:effectLst/>
+                <a:uFillTx/>
+                <a:latin typeface="Arial"/>
+                <a:ea typeface="Arial"/>
+              </a:rPr>
+              <a:t>система сборки </a:t>
+            </a:r>
+            <a:r>
+              <a:rPr lang="en-US" sz="2000" b="0" u="none" strike="noStrike" dirty="0">
+                <a:solidFill>
+                  <a:srgbClr val="4D4E4F"/>
+                </a:solidFill>
+                <a:effectLst/>
+                <a:uFillTx/>
+                <a:latin typeface="Arial"/>
+                <a:ea typeface="Arial"/>
+              </a:rPr>
+              <a:t>cargo, crates.io</a:t>
+            </a:r>
+            <a:r>
+              <a:rPr lang="ru" sz="2000" b="0" u="none" strike="noStrike" dirty="0">
+                <a:solidFill>
+                  <a:srgbClr val="4D4E4F"/>
+                </a:solidFill>
+                <a:effectLst/>
+                <a:uFillTx/>
+                <a:latin typeface="Arial"/>
+                <a:ea typeface="Arial"/>
+              </a:rPr>
+              <a:t>);</a:t>
             </a:r>
             <a:endParaRPr lang="en-US" sz="2000" b="0" u="none" strike="noStrike" dirty="0">
               <a:solidFill>
@@ -9476,7 +9509,7 @@
             <a:r>
               <a:rPr lang="ru" sz="2000" b="0" u="none" strike="noStrike" dirty="0">
                 <a:solidFill>
-                  <a:srgbClr val="4D4E4F"/>
+                  <a:srgbClr val="FF0000"/>
                 </a:solidFill>
                 <a:effectLst/>
                 <a:uFillTx/>
@@ -9487,7 +9520,7 @@
             </a:r>
             <a:endParaRPr lang="en-US" sz="2000" b="0" u="none" strike="noStrike" dirty="0">
               <a:solidFill>
-                <a:srgbClr val="000000"/>
+                <a:srgbClr val="FF0000"/>
               </a:solidFill>
               <a:effectLst/>
               <a:uFillTx/>
@@ -9554,7 +9587,7 @@
         </p:blipFill>
         <p:spPr>
           <a:xfrm>
-            <a:off x="3227554" y="3482861"/>
+            <a:off x="3133290" y="3348915"/>
             <a:ext cx="3562350" cy="1609725"/>
           </a:xfrm>
           <a:prstGeom prst="rect">
@@ -9716,7 +9749,7 @@
         </p:nvSpPr>
         <p:spPr>
           <a:xfrm>
-            <a:off x="457200" y="1143000"/>
+            <a:off x="442800" y="972270"/>
             <a:ext cx="8261280" cy="3198960"/>
           </a:xfrm>
           <a:prstGeom prst="rect">
@@ -9890,7 +9923,7 @@
         </p:blipFill>
         <p:spPr bwMode="auto">
           <a:xfrm>
-            <a:off x="3398291" y="3803458"/>
+            <a:off x="3353936" y="3669476"/>
             <a:ext cx="2436127" cy="1218064"/>
           </a:xfrm>
           <a:prstGeom prst="rect">

</xml_diff>

<commit_message>
Result pres+speech finished [We're done boys]
</commit_message>
<xml_diff>
--- a/docs/Result/Презентация.pptx
+++ b/docs/Result/Презентация.pptx
@@ -13,16 +13,15 @@
     <p:sldId id="267" r:id="rId7"/>
     <p:sldId id="268" r:id="rId8"/>
     <p:sldId id="258" r:id="rId9"/>
-    <p:sldId id="265" r:id="rId10"/>
-    <p:sldId id="259" r:id="rId11"/>
-    <p:sldId id="269" r:id="rId12"/>
-    <p:sldId id="260" r:id="rId13"/>
-    <p:sldId id="270" r:id="rId14"/>
-    <p:sldId id="271" r:id="rId15"/>
-    <p:sldId id="261" r:id="rId16"/>
-    <p:sldId id="262" r:id="rId17"/>
-    <p:sldId id="263" r:id="rId18"/>
-    <p:sldId id="264" r:id="rId19"/>
+    <p:sldId id="259" r:id="rId10"/>
+    <p:sldId id="269" r:id="rId11"/>
+    <p:sldId id="260" r:id="rId12"/>
+    <p:sldId id="270" r:id="rId13"/>
+    <p:sldId id="271" r:id="rId14"/>
+    <p:sldId id="261" r:id="rId15"/>
+    <p:sldId id="262" r:id="rId16"/>
+    <p:sldId id="263" r:id="rId17"/>
+    <p:sldId id="264" r:id="rId18"/>
   </p:sldIdLst>
   <p:sldSz cx="9144000" cy="5143500" type="screen16x9"/>
   <p:notesSz cx="7772400" cy="10058400"/>
@@ -4489,7 +4488,7 @@
               </a:tabLst>
             </a:pPr>
             <a:r>
-              <a:rPr lang="ru" sz="1800" b="0" u="none" strike="noStrike">
+              <a:rPr lang="ru" sz="1800" b="0" u="none" strike="noStrike" dirty="0">
                 <a:solidFill>
                   <a:srgbClr val="FFFFFF"/>
                 </a:solidFill>
@@ -4500,7 +4499,7 @@
               </a:rPr>
               <a:t>Санкт-Петербургский государственный университет телекоммуникаций им. проф. М.А. Бонч-Бруевича</a:t>
             </a:r>
-            <a:endParaRPr lang="en-US" sz="1800" b="0" u="none" strike="noStrike">
+            <a:endParaRPr lang="en-US" sz="1800" b="0" u="none" strike="noStrike" dirty="0">
               <a:solidFill>
                 <a:srgbClr val="000000"/>
               </a:solidFill>
@@ -4923,223 +4922,6 @@
 </file>
 
 <file path=ppt/slides/slide10.xml><?xml version="1.0" encoding="utf-8"?>
-<p:sld xmlns:a="http://schemas.openxmlformats.org/drawingml/2006/main" xmlns:r="http://schemas.openxmlformats.org/officeDocument/2006/relationships" xmlns:p="http://schemas.openxmlformats.org/presentationml/2006/main">
-  <p:cSld>
-    <p:spTree>
-      <p:nvGrpSpPr>
-        <p:cNvPr id="1" name=""/>
-        <p:cNvGrpSpPr/>
-        <p:nvPr/>
-      </p:nvGrpSpPr>
-      <p:grpSpPr>
-        <a:xfrm>
-          <a:off x="0" y="0"/>
-          <a:ext cx="0" cy="0"/>
-          <a:chOff x="0" y="0"/>
-          <a:chExt cx="0" cy="0"/>
-        </a:xfrm>
-      </p:grpSpPr>
-      <p:sp>
-        <p:nvSpPr>
-          <p:cNvPr id="53" name="PlaceHolder 1"/>
-          <p:cNvSpPr>
-            <a:spLocks noGrp="1"/>
-          </p:cNvSpPr>
-          <p:nvPr>
-            <p:ph type="title"/>
-          </p:nvPr>
-        </p:nvSpPr>
-        <p:spPr>
-          <a:xfrm>
-            <a:off x="442800" y="337680"/>
-            <a:ext cx="6252840" cy="437400"/>
-          </a:xfrm>
-          <a:prstGeom prst="rect">
-            <a:avLst/>
-          </a:prstGeom>
-          <a:noFill/>
-          <a:ln w="0">
-            <a:noFill/>
-          </a:ln>
-        </p:spPr>
-        <p:txBody>
-          <a:bodyPr lIns="19080" tIns="19080" rIns="19080" bIns="19080" anchor="t">
-            <a:noAutofit/>
-          </a:bodyPr>
-          <a:lstStyle/>
-          <a:p>
-            <a:pPr indent="0">
-              <a:lnSpc>
-                <a:spcPct val="80000"/>
-              </a:lnSpc>
-              <a:buNone/>
-              <a:tabLst>
-                <a:tab pos="0" algn="l"/>
-              </a:tabLst>
-            </a:pPr>
-            <a:r>
-              <a:rPr lang="ru-RU" sz="2400" b="1" u="none" strike="noStrike" dirty="0">
-                <a:solidFill>
-                  <a:srgbClr val="FF9400"/>
-                </a:solidFill>
-                <a:effectLst/>
-                <a:uFillTx/>
-                <a:latin typeface="Arial"/>
-                <a:ea typeface="Arial"/>
-              </a:rPr>
-              <a:t>Структура </a:t>
-            </a:r>
-            <a:r>
-              <a:rPr lang="en-US" sz="2400" b="1" u="none" strike="noStrike" dirty="0">
-                <a:solidFill>
-                  <a:srgbClr val="FF9400"/>
-                </a:solidFill>
-                <a:effectLst/>
-                <a:uFillTx/>
-                <a:latin typeface="Arial"/>
-                <a:ea typeface="Arial"/>
-              </a:rPr>
-              <a:t>ECS</a:t>
-            </a:r>
-            <a:endParaRPr lang="en-US" sz="2400" b="0" u="none" strike="noStrike" dirty="0">
-              <a:solidFill>
-                <a:srgbClr val="000000"/>
-              </a:solidFill>
-              <a:effectLst/>
-              <a:uFillTx/>
-              <a:latin typeface="Arial"/>
-            </a:endParaRPr>
-          </a:p>
-        </p:txBody>
-      </p:sp>
-      <p:sp>
-        <p:nvSpPr>
-          <p:cNvPr id="54" name="PlaceHolder 2"/>
-          <p:cNvSpPr>
-            <a:spLocks noGrp="1"/>
-          </p:cNvSpPr>
-          <p:nvPr>
-            <p:ph type="sldNum" idx="11"/>
-          </p:nvPr>
-        </p:nvSpPr>
-        <p:spPr>
-          <a:xfrm>
-            <a:off x="8704080" y="4816440"/>
-            <a:ext cx="203040" cy="142200"/>
-          </a:xfrm>
-          <a:prstGeom prst="rect">
-            <a:avLst/>
-          </a:prstGeom>
-          <a:noFill/>
-          <a:ln w="0">
-            <a:noFill/>
-          </a:ln>
-        </p:spPr>
-        <p:txBody>
-          <a:bodyPr lIns="19080" tIns="19080" rIns="19080" bIns="19080" anchor="t">
-            <a:noAutofit/>
-          </a:bodyPr>
-          <a:lstStyle>
-            <a:lvl1pPr indent="0" algn="r">
-              <a:lnSpc>
-                <a:spcPct val="100000"/>
-              </a:lnSpc>
-              <a:buNone/>
-              <a:tabLst>
-                <a:tab pos="0" algn="l"/>
-              </a:tabLst>
-              <a:defRPr lang="ru" sz="1100" b="0" u="none" strike="noStrike">
-                <a:solidFill>
-                  <a:srgbClr val="4D4E4F"/>
-                </a:solidFill>
-                <a:effectLst/>
-                <a:uFillTx/>
-                <a:latin typeface="Arial"/>
-                <a:ea typeface="Arial"/>
-              </a:defRPr>
-            </a:lvl1pPr>
-          </a:lstStyle>
-          <a:p>
-            <a:pPr indent="0" algn="r">
-              <a:lnSpc>
-                <a:spcPct val="100000"/>
-              </a:lnSpc>
-              <a:buNone/>
-              <a:tabLst>
-                <a:tab pos="0" algn="l"/>
-              </a:tabLst>
-            </a:pPr>
-            <a:fld id="{6D3636B9-FACD-4729-959E-76A3CB26FC1F}" type="slidenum">
-              <a:rPr lang="ru" sz="1100" b="0" u="none" strike="noStrike">
-                <a:solidFill>
-                  <a:srgbClr val="4D4E4F"/>
-                </a:solidFill>
-                <a:effectLst/>
-                <a:uFillTx/>
-                <a:latin typeface="Arial"/>
-                <a:ea typeface="Arial"/>
-              </a:rPr>
-              <a:t>10</a:t>
-            </a:fld>
-            <a:endParaRPr lang="en-US" sz="1100" b="0" u="none" strike="noStrike">
-              <a:solidFill>
-                <a:srgbClr val="000000"/>
-              </a:solidFill>
-              <a:effectLst/>
-              <a:uFillTx/>
-              <a:latin typeface="Times New Roman"/>
-            </a:endParaRPr>
-          </a:p>
-        </p:txBody>
-      </p:sp>
-      <p:pic>
-        <p:nvPicPr>
-          <p:cNvPr id="5" name="Рисунок 4">
-            <a:extLst>
-              <a:ext uri="{FF2B5EF4-FFF2-40B4-BE49-F238E27FC236}">
-                <a16:creationId xmlns:a16="http://schemas.microsoft.com/office/drawing/2014/main" id="{88447011-8329-4B87-94F5-24169167ABF0}"/>
-              </a:ext>
-            </a:extLst>
-          </p:cNvPr>
-          <p:cNvPicPr/>
-          <p:nvPr/>
-        </p:nvPicPr>
-        <p:blipFill>
-          <a:blip r:embed="rId2">
-            <a:extLst>
-              <a:ext uri="{28A0092B-C50C-407E-A947-70E740481C1C}">
-                <a14:useLocalDpi xmlns:a14="http://schemas.microsoft.com/office/drawing/2010/main" val="0"/>
-              </a:ext>
-            </a:extLst>
-          </a:blip>
-          <a:srcRect/>
-          <a:stretch>
-            <a:fillRect/>
-          </a:stretch>
-        </p:blipFill>
-        <p:spPr bwMode="auto">
-          <a:xfrm>
-            <a:off x="1604962" y="1704975"/>
-            <a:ext cx="5934075" cy="1733550"/>
-          </a:xfrm>
-          <a:prstGeom prst="rect">
-            <a:avLst/>
-          </a:prstGeom>
-          <a:noFill/>
-          <a:ln>
-            <a:noFill/>
-          </a:ln>
-        </p:spPr>
-      </p:pic>
-    </p:spTree>
-  </p:cSld>
-  <p:clrMapOvr>
-    <a:masterClrMapping/>
-  </p:clrMapOvr>
-</p:sld>
-</file>
-
-<file path=ppt/slides/slide11.xml><?xml version="1.0" encoding="utf-8"?>
 <p:sld xmlns:a="http://schemas.openxmlformats.org/drawingml/2006/main" xmlns:r="http://schemas.openxmlformats.org/officeDocument/2006/relationships" xmlns:p="http://schemas.openxmlformats.org/presentationml/2006/main">
   <p:cSld>
     <p:spTree>
@@ -5372,7 +5154,7 @@
             <a:fld id="{A784A474-F8F9-4DC5-8AFE-6638820E2D4C}" type="slidenum">
               <a:rPr lang="ru-RU" smtClean="0"/>
               <a:pPr/>
-              <a:t>11</a:t>
+              <a:t>10</a:t>
             </a:fld>
             <a:endParaRPr lang="ru-RU" dirty="0">
               <a:solidFill>
@@ -5513,7 +5295,7 @@
 </p:sld>
 </file>
 
-<file path=ppt/slides/slide12.xml><?xml version="1.0" encoding="utf-8"?>
+<file path=ppt/slides/slide11.xml><?xml version="1.0" encoding="utf-8"?>
 <p:sld xmlns:a="http://schemas.openxmlformats.org/drawingml/2006/main" xmlns:r="http://schemas.openxmlformats.org/officeDocument/2006/relationships" xmlns:p="http://schemas.openxmlformats.org/presentationml/2006/main">
   <p:cSld>
     <p:spTree>
@@ -5824,7 +5606,7 @@
             <a:fld id="{A784A474-F8F9-4DC5-8AFE-6638820E2D4C}" type="slidenum">
               <a:rPr lang="ru-RU" smtClean="0"/>
               <a:pPr/>
-              <a:t>12</a:t>
+              <a:t>11</a:t>
             </a:fld>
             <a:endParaRPr lang="ru-RU" dirty="0">
               <a:solidFill>
@@ -5848,7 +5630,7 @@
 </p:sld>
 </file>
 
-<file path=ppt/slides/slide13.xml><?xml version="1.0" encoding="utf-8"?>
+<file path=ppt/slides/slide12.xml><?xml version="1.0" encoding="utf-8"?>
 <p:sld xmlns:a="http://schemas.openxmlformats.org/drawingml/2006/main" xmlns:r="http://schemas.openxmlformats.org/officeDocument/2006/relationships" xmlns:p="http://schemas.openxmlformats.org/presentationml/2006/main">
   <p:cSld>
     <p:spTree>
@@ -5905,18 +5687,16 @@
             <a:r>
               <a:rPr lang="ru-RU" sz="2400" b="1" dirty="0">
                 <a:solidFill>
-                  <a:srgbClr val="FF0000"/>
-                </a:solidFill>
-                <a:ea typeface="Arial"/>
+                  <a:srgbClr val="FF9400"/>
+                </a:solidFill>
+                <a:latin typeface="Arial"/>
               </a:rPr>
               <a:t>Сетевое исследование нагрузки на сеть</a:t>
             </a:r>
-            <a:endParaRPr lang="en-US" sz="2400" b="0" u="none" strike="noStrike" dirty="0">
+            <a:endParaRPr lang="en-US" sz="2400" b="1" dirty="0">
               <a:solidFill>
-                <a:srgbClr val="FF0000"/>
+                <a:srgbClr val="FF9400"/>
               </a:solidFill>
-              <a:effectLst/>
-              <a:uFillTx/>
               <a:latin typeface="Arial"/>
             </a:endParaRPr>
           </a:p>
@@ -5989,7 +5769,7 @@
                 <a:latin typeface="Arial"/>
                 <a:ea typeface="Arial"/>
               </a:rPr>
-              <a:t>13</a:t>
+              <a:t>12</a:t>
             </a:fld>
             <a:endParaRPr lang="en-US" sz="1100" b="0" u="none" strike="noStrike">
               <a:solidFill>
@@ -6004,10 +5784,10 @@
       </p:sp>
       <p:pic>
         <p:nvPicPr>
-          <p:cNvPr id="5" name="Рисунок 4">
+          <p:cNvPr id="7" name="Рисунок 6">
             <a:extLst>
               <a:ext uri="{FF2B5EF4-FFF2-40B4-BE49-F238E27FC236}">
-                <a16:creationId xmlns:a16="http://schemas.microsoft.com/office/drawing/2014/main" id="{E68EFCC5-A6EC-4B83-A138-0D04491C9750}"/>
+                <a16:creationId xmlns:a16="http://schemas.microsoft.com/office/drawing/2014/main" id="{1E7B6B15-5B62-47E0-912C-F4EAF80897C3}"/>
               </a:ext>
             </a:extLst>
           </p:cNvPr>
@@ -6029,8 +5809,8 @@
         </p:blipFill>
         <p:spPr bwMode="auto">
           <a:xfrm>
-            <a:off x="637725" y="830757"/>
-            <a:ext cx="3047171" cy="1233858"/>
+            <a:off x="1767385" y="3039346"/>
+            <a:ext cx="4542342" cy="1847654"/>
           </a:xfrm>
           <a:prstGeom prst="rect">
             <a:avLst/>
@@ -6043,82 +5823,327 @@
       </p:pic>
       <p:pic>
         <p:nvPicPr>
-          <p:cNvPr id="6" name="Рисунок 5">
+          <p:cNvPr id="11" name="Рисунок 10">
             <a:extLst>
               <a:ext uri="{FF2B5EF4-FFF2-40B4-BE49-F238E27FC236}">
-                <a16:creationId xmlns:a16="http://schemas.microsoft.com/office/drawing/2014/main" id="{8B88A3C6-9905-4C03-9EA7-6535A62B9F2A}"/>
+                <a16:creationId xmlns:a16="http://schemas.microsoft.com/office/drawing/2014/main" id="{9F20F4E4-E1BC-45E5-9FEE-F207A777C29B}"/>
               </a:ext>
             </a:extLst>
           </p:cNvPr>
-          <p:cNvPicPr/>
+          <p:cNvPicPr>
+            <a:picLocks noChangeAspect="1"/>
+          </p:cNvPicPr>
           <p:nvPr/>
         </p:nvPicPr>
         <p:blipFill>
-          <a:blip r:embed="rId3" cstate="print">
-            <a:extLst>
-              <a:ext uri="{28A0092B-C50C-407E-A947-70E740481C1C}">
-                <a14:useLocalDpi xmlns:a14="http://schemas.microsoft.com/office/drawing/2010/main" val="0"/>
-              </a:ext>
-            </a:extLst>
-          </a:blip>
-          <a:srcRect/>
+          <a:blip r:embed="rId3"/>
           <a:stretch>
             <a:fillRect/>
           </a:stretch>
         </p:blipFill>
-        <p:spPr bwMode="auto">
+        <p:spPr>
           <a:xfrm>
-            <a:off x="2363708" y="2121372"/>
-            <a:ext cx="3204579" cy="1303175"/>
+            <a:off x="442800" y="1041510"/>
+            <a:ext cx="3207976" cy="1905207"/>
+          </a:xfrm>
+          <a:prstGeom prst="rect">
+            <a:avLst/>
+          </a:prstGeom>
+        </p:spPr>
+      </p:pic>
+      <p:pic>
+        <p:nvPicPr>
+          <p:cNvPr id="17" name="Рисунок 16">
+            <a:extLst>
+              <a:ext uri="{FF2B5EF4-FFF2-40B4-BE49-F238E27FC236}">
+                <a16:creationId xmlns:a16="http://schemas.microsoft.com/office/drawing/2014/main" id="{278BA090-6B67-42A4-9FFA-FE46BB9130DD}"/>
+              </a:ext>
+            </a:extLst>
+          </p:cNvPr>
+          <p:cNvPicPr>
+            <a:picLocks noChangeAspect="1"/>
+          </p:cNvPicPr>
+          <p:nvPr/>
+        </p:nvPicPr>
+        <p:blipFill>
+          <a:blip r:embed="rId4"/>
+          <a:stretch>
+            <a:fillRect/>
+          </a:stretch>
+        </p:blipFill>
+        <p:spPr>
+          <a:xfrm>
+            <a:off x="4181475" y="774000"/>
+            <a:ext cx="3899902" cy="2191182"/>
+          </a:xfrm>
+          <a:prstGeom prst="rect">
+            <a:avLst/>
+          </a:prstGeom>
+        </p:spPr>
+      </p:pic>
+      <p:sp>
+        <p:nvSpPr>
+          <p:cNvPr id="8" name="PlaceHolder 11">
+            <a:extLst>
+              <a:ext uri="{FF2B5EF4-FFF2-40B4-BE49-F238E27FC236}">
+                <a16:creationId xmlns:a16="http://schemas.microsoft.com/office/drawing/2014/main" id="{3B63E440-A5DB-4060-9A47-5BFF746432FB}"/>
+              </a:ext>
+            </a:extLst>
+          </p:cNvPr>
+          <p:cNvSpPr/>
+          <p:nvPr/>
+        </p:nvSpPr>
+        <p:spPr>
+          <a:xfrm>
+            <a:off x="1295785" y="687148"/>
+            <a:ext cx="2354991" cy="436320"/>
           </a:xfrm>
           <a:prstGeom prst="rect">
             <a:avLst/>
           </a:prstGeom>
           <a:noFill/>
-          <a:ln>
+          <a:ln w="0">
             <a:noFill/>
           </a:ln>
         </p:spPr>
-      </p:pic>
-      <p:pic>
-        <p:nvPicPr>
-          <p:cNvPr id="7" name="Рисунок 6">
+        <p:style>
+          <a:lnRef idx="0">
+            <a:scrgbClr r="0" g="0" b="0"/>
+          </a:lnRef>
+          <a:fillRef idx="0">
+            <a:scrgbClr r="0" g="0" b="0"/>
+          </a:fillRef>
+          <a:effectRef idx="0">
+            <a:scrgbClr r="0" g="0" b="0"/>
+          </a:effectRef>
+          <a:fontRef idx="minor"/>
+        </p:style>
+        <p:txBody>
+          <a:bodyPr lIns="19080" tIns="19080" rIns="19080" bIns="19080" anchor="t">
+            <a:noAutofit/>
+          </a:bodyPr>
+          <a:lstStyle/>
+          <a:p>
+            <a:pPr>
+              <a:lnSpc>
+                <a:spcPct val="120000"/>
+              </a:lnSpc>
+              <a:tabLst>
+                <a:tab pos="0" algn="l"/>
+              </a:tabLst>
+            </a:pPr>
+            <a:r>
+              <a:rPr lang="ru-RU" sz="1600" b="0" u="none" strike="noStrike" dirty="0">
+                <a:solidFill>
+                  <a:srgbClr val="000000"/>
+                </a:solidFill>
+                <a:effectLst/>
+                <a:uFillTx/>
+                <a:latin typeface="Arial"/>
+              </a:rPr>
+              <a:t>«Боярский турнир»</a:t>
+            </a:r>
+            <a:endParaRPr lang="en-US" sz="1600" b="0" u="none" strike="noStrike" dirty="0">
+              <a:solidFill>
+                <a:srgbClr val="000000"/>
+              </a:solidFill>
+              <a:effectLst/>
+              <a:uFillTx/>
+              <a:latin typeface="Arial"/>
+            </a:endParaRPr>
+          </a:p>
+        </p:txBody>
+      </p:sp>
+      <p:sp>
+        <p:nvSpPr>
+          <p:cNvPr id="9" name="PlaceHolder 11">
             <a:extLst>
               <a:ext uri="{FF2B5EF4-FFF2-40B4-BE49-F238E27FC236}">
-                <a16:creationId xmlns:a16="http://schemas.microsoft.com/office/drawing/2014/main" id="{1E7B6B15-5B62-47E0-912C-F4EAF80897C3}"/>
+                <a16:creationId xmlns:a16="http://schemas.microsoft.com/office/drawing/2014/main" id="{F2D5C4F8-B3CB-4B06-9CD6-6E34A5D6D165}"/>
               </a:ext>
             </a:extLst>
           </p:cNvPr>
-          <p:cNvPicPr/>
+          <p:cNvSpPr/>
           <p:nvPr/>
-        </p:nvPicPr>
-        <p:blipFill>
-          <a:blip r:embed="rId4" cstate="print">
-            <a:extLst>
-              <a:ext uri="{28A0092B-C50C-407E-A947-70E740481C1C}">
-                <a14:useLocalDpi xmlns:a14="http://schemas.microsoft.com/office/drawing/2010/main" val="0"/>
-              </a:ext>
-            </a:extLst>
-          </a:blip>
-          <a:srcRect/>
-          <a:stretch>
-            <a:fillRect/>
-          </a:stretch>
-        </p:blipFill>
-        <p:spPr bwMode="auto">
+        </p:nvSpPr>
+        <p:spPr>
           <a:xfrm>
-            <a:off x="4619767" y="3427431"/>
-            <a:ext cx="3414792" cy="1389009"/>
+            <a:off x="5445038" y="630004"/>
+            <a:ext cx="2354991" cy="436320"/>
           </a:xfrm>
           <a:prstGeom prst="rect">
             <a:avLst/>
           </a:prstGeom>
           <a:noFill/>
-          <a:ln>
+          <a:ln w="0">
             <a:noFill/>
           </a:ln>
         </p:spPr>
-      </p:pic>
+        <p:style>
+          <a:lnRef idx="0">
+            <a:scrgbClr r="0" g="0" b="0"/>
+          </a:lnRef>
+          <a:fillRef idx="0">
+            <a:scrgbClr r="0" g="0" b="0"/>
+          </a:fillRef>
+          <a:effectRef idx="0">
+            <a:scrgbClr r="0" g="0" b="0"/>
+          </a:effectRef>
+          <a:fontRef idx="minor"/>
+        </p:style>
+        <p:txBody>
+          <a:bodyPr lIns="19080" tIns="19080" rIns="19080" bIns="19080" anchor="t">
+            <a:noAutofit/>
+          </a:bodyPr>
+          <a:lstStyle/>
+          <a:p>
+            <a:pPr>
+              <a:lnSpc>
+                <a:spcPct val="120000"/>
+              </a:lnSpc>
+              <a:tabLst>
+                <a:tab pos="0" algn="l"/>
+              </a:tabLst>
+            </a:pPr>
+            <a:r>
+              <a:rPr lang="ru-RU" sz="1600" b="0" u="none" strike="noStrike" dirty="0">
+                <a:solidFill>
+                  <a:srgbClr val="000000"/>
+                </a:solidFill>
+                <a:effectLst/>
+                <a:uFillTx/>
+                <a:latin typeface="Arial"/>
+              </a:rPr>
+              <a:t>«</a:t>
+            </a:r>
+            <a:r>
+              <a:rPr lang="en-US" sz="1600" b="0" u="none" strike="noStrike" dirty="0">
+                <a:solidFill>
+                  <a:srgbClr val="000000"/>
+                </a:solidFill>
+                <a:effectLst/>
+                <a:uFillTx/>
+                <a:latin typeface="Arial"/>
+              </a:rPr>
+              <a:t>Clash Royale</a:t>
+            </a:r>
+            <a:r>
+              <a:rPr lang="ru-RU" sz="1600" b="0" u="none" strike="noStrike" dirty="0">
+                <a:solidFill>
+                  <a:srgbClr val="000000"/>
+                </a:solidFill>
+                <a:effectLst/>
+                <a:uFillTx/>
+                <a:latin typeface="Arial"/>
+              </a:rPr>
+              <a:t>»</a:t>
+            </a:r>
+            <a:endParaRPr lang="en-US" sz="1600" b="0" u="none" strike="noStrike" dirty="0">
+              <a:solidFill>
+                <a:srgbClr val="000000"/>
+              </a:solidFill>
+              <a:effectLst/>
+              <a:uFillTx/>
+              <a:latin typeface="Arial"/>
+            </a:endParaRPr>
+          </a:p>
+        </p:txBody>
+      </p:sp>
+      <p:sp>
+        <p:nvSpPr>
+          <p:cNvPr id="10" name="PlaceHolder 11">
+            <a:extLst>
+              <a:ext uri="{FF2B5EF4-FFF2-40B4-BE49-F238E27FC236}">
+                <a16:creationId xmlns:a16="http://schemas.microsoft.com/office/drawing/2014/main" id="{D30990DB-21F5-44F5-8759-2167469F927D}"/>
+              </a:ext>
+            </a:extLst>
+          </p:cNvPr>
+          <p:cNvSpPr/>
+          <p:nvPr/>
+        </p:nvSpPr>
+        <p:spPr>
+          <a:xfrm>
+            <a:off x="6551049" y="3858117"/>
+            <a:ext cx="2354991" cy="436320"/>
+          </a:xfrm>
+          <a:prstGeom prst="rect">
+            <a:avLst/>
+          </a:prstGeom>
+          <a:noFill/>
+          <a:ln w="0">
+            <a:noFill/>
+          </a:ln>
+        </p:spPr>
+        <p:style>
+          <a:lnRef idx="0">
+            <a:scrgbClr r="0" g="0" b="0"/>
+          </a:lnRef>
+          <a:fillRef idx="0">
+            <a:scrgbClr r="0" g="0" b="0"/>
+          </a:fillRef>
+          <a:effectRef idx="0">
+            <a:scrgbClr r="0" g="0" b="0"/>
+          </a:effectRef>
+          <a:fontRef idx="minor"/>
+        </p:style>
+        <p:txBody>
+          <a:bodyPr lIns="19080" tIns="19080" rIns="19080" bIns="19080" anchor="t">
+            <a:noAutofit/>
+          </a:bodyPr>
+          <a:lstStyle/>
+          <a:p>
+            <a:pPr>
+              <a:lnSpc>
+                <a:spcPct val="120000"/>
+              </a:lnSpc>
+              <a:tabLst>
+                <a:tab pos="0" algn="l"/>
+              </a:tabLst>
+            </a:pPr>
+            <a:r>
+              <a:rPr lang="ru-RU" sz="1600" b="0" u="none" strike="noStrike" dirty="0">
+                <a:solidFill>
+                  <a:srgbClr val="000000"/>
+                </a:solidFill>
+                <a:effectLst/>
+                <a:uFillTx/>
+                <a:latin typeface="Arial"/>
+              </a:rPr>
+              <a:t>«</a:t>
+            </a:r>
+            <a:r>
+              <a:rPr lang="en-US" sz="1600" b="0" u="none" strike="noStrike" dirty="0">
+                <a:solidFill>
+                  <a:srgbClr val="000000"/>
+                </a:solidFill>
+                <a:effectLst/>
+                <a:uFillTx/>
+                <a:latin typeface="Arial"/>
+              </a:rPr>
+              <a:t>Rush Royale</a:t>
+            </a:r>
+            <a:r>
+              <a:rPr lang="ru-RU" sz="1600" b="0" u="none" strike="noStrike" dirty="0">
+                <a:solidFill>
+                  <a:srgbClr val="000000"/>
+                </a:solidFill>
+                <a:effectLst/>
+                <a:uFillTx/>
+                <a:latin typeface="Arial"/>
+              </a:rPr>
+              <a:t>»</a:t>
+            </a:r>
+            <a:endParaRPr lang="en-US" sz="1600" b="0" u="none" strike="noStrike" dirty="0">
+              <a:solidFill>
+                <a:srgbClr val="000000"/>
+              </a:solidFill>
+              <a:effectLst/>
+              <a:uFillTx/>
+              <a:latin typeface="Arial"/>
+            </a:endParaRPr>
+          </a:p>
+        </p:txBody>
+      </p:sp>
     </p:spTree>
   </p:cSld>
   <p:clrMapOvr>
@@ -6127,7 +6152,7 @@
 </p:sld>
 </file>
 
-<file path=ppt/slides/slide14.xml><?xml version="1.0" encoding="utf-8"?>
+<file path=ppt/slides/slide13.xml><?xml version="1.0" encoding="utf-8"?>
 <p:sld xmlns:a="http://schemas.openxmlformats.org/drawingml/2006/main" xmlns:r="http://schemas.openxmlformats.org/officeDocument/2006/relationships" xmlns:p="http://schemas.openxmlformats.org/presentationml/2006/main">
   <p:cSld>
     <p:spTree>
@@ -6272,7 +6297,7 @@
                 <a:latin typeface="Arial"/>
                 <a:ea typeface="Arial"/>
               </a:rPr>
-              <a:t>14</a:t>
+              <a:t>13</a:t>
             </a:fld>
             <a:endParaRPr lang="en-US" sz="1100" b="0" u="none" strike="noStrike">
               <a:solidFill>
@@ -6323,7 +6348,7 @@
 </p:sld>
 </file>
 
-<file path=ppt/slides/slide15.xml><?xml version="1.0" encoding="utf-8"?>
+<file path=ppt/slides/slide14.xml><?xml version="1.0" encoding="utf-8"?>
 <p:sld xmlns:a="http://schemas.openxmlformats.org/drawingml/2006/main" xmlns:r="http://schemas.openxmlformats.org/officeDocument/2006/relationships" xmlns:p="http://schemas.openxmlformats.org/presentationml/2006/main">
   <p:cSld>
     <p:spTree>
@@ -6468,7 +6493,7 @@
                 <a:latin typeface="Arial"/>
                 <a:ea typeface="Arial"/>
               </a:rPr>
-              <a:t>15</a:t>
+              <a:t>14</a:t>
             </a:fld>
             <a:endParaRPr lang="en-US" sz="1100" b="0" u="none" strike="noStrike">
               <a:solidFill>
@@ -6619,7 +6644,7 @@
 </p:sld>
 </file>
 
-<file path=ppt/slides/slide16.xml><?xml version="1.0" encoding="utf-8"?>
+<file path=ppt/slides/slide15.xml><?xml version="1.0" encoding="utf-8"?>
 <p:sld xmlns:a="http://schemas.openxmlformats.org/drawingml/2006/main" xmlns:r="http://schemas.openxmlformats.org/officeDocument/2006/relationships" xmlns:p="http://schemas.openxmlformats.org/presentationml/2006/main">
   <p:cSld>
     <p:spTree>
@@ -6764,7 +6789,7 @@
                 <a:latin typeface="Arial"/>
                 <a:ea typeface="Arial"/>
               </a:rPr>
-              <a:t>16</a:t>
+              <a:t>15</a:t>
             </a:fld>
             <a:endParaRPr lang="en-US" sz="1100" b="0" u="none" strike="noStrike">
               <a:solidFill>
@@ -6841,7 +6866,7 @@
               </a:tabLst>
             </a:pPr>
             <a:r>
-              <a:rPr lang="ru" sz="2400" b="1" u="none" strike="noStrike">
+              <a:rPr lang="ru" sz="2400" b="1" u="none" strike="noStrike" dirty="0">
                 <a:solidFill>
                   <a:srgbClr val="FF9400"/>
                 </a:solidFill>
@@ -6852,7 +6877,7 @@
               </a:rPr>
               <a:t>Постановка задачи</a:t>
             </a:r>
-            <a:endParaRPr lang="en-US" sz="2400" b="0" u="none" strike="noStrike">
+            <a:endParaRPr lang="en-US" sz="2400" b="0" u="none" strike="noStrike" dirty="0">
               <a:solidFill>
                 <a:srgbClr val="000000"/>
               </a:solidFill>
@@ -8325,22 +8350,32 @@
               </a:tabLst>
             </a:pPr>
             <a:r>
+              <a:rPr lang="en-US" sz="2400" b="1" dirty="0">
+                <a:solidFill>
+                  <a:srgbClr val="FF9400"/>
+                </a:solidFill>
+                <a:latin typeface="Arial"/>
+              </a:rPr>
+              <a:t>Clash Royale </a:t>
+            </a:r>
+            <a:r>
               <a:rPr lang="ru-RU" sz="2400" b="1" dirty="0">
                 <a:solidFill>
-                  <a:srgbClr val="FF0000"/>
-                </a:solidFill>
-                <a:latin typeface="Arial"/>
-              </a:rPr>
-              <a:t>Анализ существующих аналогов</a:t>
-            </a:r>
-            <a:endParaRPr lang="en-US" sz="2400" b="0" u="none" strike="noStrike" dirty="0">
-              <a:solidFill>
-                <a:srgbClr val="FF0000"/>
-              </a:solidFill>
-              <a:effectLst/>
-              <a:uFillTx/>
-              <a:latin typeface="Arial"/>
-            </a:endParaRPr>
+                  <a:srgbClr val="FF9400"/>
+                </a:solidFill>
+                <a:latin typeface="Arial"/>
+              </a:rPr>
+              <a:t>и </a:t>
+            </a:r>
+            <a:r>
+              <a:rPr lang="en-US" sz="2400" b="1" dirty="0">
+                <a:solidFill>
+                  <a:srgbClr val="FF9400"/>
+                </a:solidFill>
+                <a:latin typeface="Arial"/>
+              </a:rPr>
+              <a:t>Rush Royale</a:t>
+            </a:r>
           </a:p>
         </p:txBody>
       </p:sp>
@@ -8432,8 +8467,8 @@
         </p:nvSpPr>
         <p:spPr>
           <a:xfrm>
-            <a:off x="457200" y="1143000"/>
-            <a:ext cx="8261280" cy="3198960"/>
+            <a:off x="325381" y="972270"/>
+            <a:ext cx="3453636" cy="3198960"/>
           </a:xfrm>
           <a:prstGeom prst="rect">
             <a:avLst/>
@@ -8469,110 +8504,6 @@
                 <a:tab pos="0" algn="l"/>
               </a:tabLst>
             </a:pPr>
-            <a:r>
-              <a:rPr lang="ru" sz="2000" b="0" u="none" strike="noStrike" dirty="0">
-                <a:solidFill>
-                  <a:srgbClr val="4D4E4F"/>
-                </a:solidFill>
-                <a:effectLst/>
-                <a:uFillTx/>
-                <a:latin typeface="Arial"/>
-                <a:ea typeface="Arial"/>
-              </a:rPr>
-              <a:t>Основным конкурентом для разработанно</a:t>
-            </a:r>
-            <a:r>
-              <a:rPr lang="ru-RU" sz="2000" b="0" u="none" strike="noStrike" dirty="0">
-                <a:solidFill>
-                  <a:srgbClr val="4D4E4F"/>
-                </a:solidFill>
-                <a:effectLst/>
-                <a:uFillTx/>
-                <a:latin typeface="Arial"/>
-                <a:ea typeface="Arial"/>
-              </a:rPr>
-              <a:t>й игры </a:t>
-            </a:r>
-            <a:r>
-              <a:rPr lang="ru" sz="2000" b="0" u="none" strike="noStrike" dirty="0">
-                <a:solidFill>
-                  <a:srgbClr val="4D4E4F"/>
-                </a:solidFill>
-                <a:effectLst/>
-                <a:uFillTx/>
-                <a:latin typeface="Arial"/>
-                <a:ea typeface="Arial"/>
-              </a:rPr>
-              <a:t>является </a:t>
-            </a:r>
-            <a:r>
-              <a:rPr lang="en-US" sz="2000" b="1" dirty="0"/>
-              <a:t>Clash Royale</a:t>
-            </a:r>
-            <a:r>
-              <a:rPr lang="ru-RU" sz="2000" b="1" dirty="0"/>
-              <a:t> </a:t>
-            </a:r>
-            <a:r>
-              <a:rPr lang="ru" sz="2000" b="0" u="none" strike="noStrike" dirty="0">
-                <a:solidFill>
-                  <a:srgbClr val="4D4E4F"/>
-                </a:solidFill>
-                <a:effectLst/>
-                <a:uFillTx/>
-                <a:latin typeface="Arial"/>
-                <a:ea typeface="Arial"/>
-              </a:rPr>
-              <a:t>— </a:t>
-            </a:r>
-            <a:r>
-              <a:rPr lang="ru-RU" sz="2000" dirty="0">
-                <a:solidFill>
-                  <a:srgbClr val="FF0000"/>
-                </a:solidFill>
-                <a:ea typeface="Arial"/>
-              </a:rPr>
-              <a:t>многопользовательская</a:t>
-            </a:r>
-            <a:r>
-              <a:rPr lang="ru-RU" sz="2000" dirty="0">
-                <a:solidFill>
-                  <a:srgbClr val="4D4E4F"/>
-                </a:solidFill>
-                <a:ea typeface="Arial"/>
-              </a:rPr>
-              <a:t> мобильная стратегия с клиент-серверной архитектурой</a:t>
-            </a:r>
-            <a:r>
-              <a:rPr lang="ru" sz="2000" b="0" u="none" strike="noStrike" dirty="0">
-                <a:solidFill>
-                  <a:srgbClr val="4D4E4F"/>
-                </a:solidFill>
-                <a:effectLst/>
-                <a:uFillTx/>
-                <a:latin typeface="Arial"/>
-                <a:ea typeface="Arial"/>
-              </a:rPr>
-              <a:t>.</a:t>
-            </a:r>
-            <a:endParaRPr lang="en-US" sz="2000" b="0" u="none" strike="noStrike" dirty="0">
-              <a:solidFill>
-                <a:srgbClr val="000000"/>
-              </a:solidFill>
-              <a:effectLst/>
-              <a:uFillTx/>
-              <a:latin typeface="Arial"/>
-            </a:endParaRPr>
-          </a:p>
-          <a:p>
-            <a:pPr>
-              <a:lnSpc>
-                <a:spcPct val="120000"/>
-              </a:lnSpc>
-              <a:tabLst>
-                <a:tab pos="0" algn="l"/>
-              </a:tabLst>
-            </a:pPr>
             <a:endParaRPr lang="en-US" sz="1000" b="0" u="none" strike="noStrike" dirty="0">
               <a:solidFill>
                 <a:srgbClr val="000000"/>
@@ -8634,7 +8565,43 @@
                 </a:solidFill>
                 <a:ea typeface="Arial"/>
               </a:rPr>
-              <a:t>Уход Supercell из российского региона ограничивает доступ и поддержку для игроков</a:t>
+              <a:t>Уход Supercell</a:t>
+            </a:r>
+            <a:r>
+              <a:rPr lang="en-US" sz="2000" dirty="0">
+                <a:solidFill>
+                  <a:srgbClr val="4D4E4F"/>
+                </a:solidFill>
+                <a:ea typeface="Arial"/>
+              </a:rPr>
+              <a:t> </a:t>
+            </a:r>
+            <a:r>
+              <a:rPr lang="ru-RU" sz="2000" dirty="0">
+                <a:solidFill>
+                  <a:srgbClr val="4D4E4F"/>
+                </a:solidFill>
+                <a:ea typeface="Arial"/>
+              </a:rPr>
+              <a:t>и </a:t>
+            </a:r>
+            <a:r>
+              <a:rPr lang="en-US" sz="2000" dirty="0">
+                <a:solidFill>
+                  <a:srgbClr val="4D4E4F"/>
+                </a:solidFill>
+                <a:ea typeface="Arial"/>
+              </a:rPr>
+              <a:t>MY.GAMES</a:t>
+            </a:r>
+            <a:r>
+              <a:rPr lang="ru-RU" sz="2000" dirty="0">
+                <a:solidFill>
+                  <a:srgbClr val="4D4E4F"/>
+                </a:solidFill>
+                <a:ea typeface="Arial"/>
+              </a:rPr>
+              <a:t> из российского региона ограничивает доступ и поддержку для игроков</a:t>
             </a:r>
             <a:r>
               <a:rPr lang="ru" sz="2000" b="0" u="none" strike="noStrike" dirty="0">
@@ -8720,114 +8687,12 @@
           </a:p>
         </p:txBody>
       </p:sp>
-    </p:spTree>
-  </p:cSld>
-  <p:clrMapOvr>
-    <a:masterClrMapping/>
-  </p:clrMapOvr>
-</p:sld>
-</file>
-
-<file path=ppt/slides/slide7.xml><?xml version="1.0" encoding="utf-8"?>
-<p:sld xmlns:a="http://schemas.openxmlformats.org/drawingml/2006/main" xmlns:r="http://schemas.openxmlformats.org/officeDocument/2006/relationships" xmlns:p="http://schemas.openxmlformats.org/presentationml/2006/main">
-  <p:cSld>
-    <p:spTree>
-      <p:nvGrpSpPr>
-        <p:cNvPr id="1" name=""/>
-        <p:cNvGrpSpPr/>
-        <p:nvPr/>
-      </p:nvGrpSpPr>
-      <p:grpSpPr>
-        <a:xfrm>
-          <a:off x="0" y="0"/>
-          <a:ext cx="0" cy="0"/>
-          <a:chOff x="0" y="0"/>
-          <a:chExt cx="0" cy="0"/>
-        </a:xfrm>
-      </p:grpSpPr>
-      <p:sp>
-        <p:nvSpPr>
-          <p:cNvPr id="2" name="PlaceHolder 1">
+      <p:pic>
+        <p:nvPicPr>
+          <p:cNvPr id="5" name="Рисунок 4">
             <a:extLst>
               <a:ext uri="{FF2B5EF4-FFF2-40B4-BE49-F238E27FC236}">
-                <a16:creationId xmlns:a16="http://schemas.microsoft.com/office/drawing/2014/main" id="{07128B85-001A-4B30-9C2B-84F4174A9D7A}"/>
-              </a:ext>
-            </a:extLst>
-          </p:cNvPr>
-          <p:cNvSpPr txBox="1">
-            <a:spLocks/>
-          </p:cNvSpPr>
-          <p:nvPr/>
-        </p:nvSpPr>
-        <p:spPr>
-          <a:xfrm>
-            <a:off x="442800" y="337680"/>
-            <a:ext cx="6252840" cy="437400"/>
-          </a:xfrm>
-          <a:prstGeom prst="rect">
-            <a:avLst/>
-          </a:prstGeom>
-          <a:noFill/>
-          <a:ln w="0">
-            <a:noFill/>
-          </a:ln>
-        </p:spPr>
-        <p:txBody>
-          <a:bodyPr lIns="19080" tIns="19080" rIns="19080" bIns="19080" anchor="t">
-            <a:noAutofit/>
-          </a:bodyPr>
-          <a:lstStyle>
-            <a:lvl1pPr algn="l" defTabSz="914400" rtl="0" eaLnBrk="1" latinLnBrk="0" hangingPunct="1">
-              <a:lnSpc>
-                <a:spcPct val="90000"/>
-              </a:lnSpc>
-              <a:spcBef>
-                <a:spcPct val="0"/>
-              </a:spcBef>
-              <a:buNone/>
-              <a:defRPr sz="4400" kern="1200">
-                <a:solidFill>
-                  <a:schemeClr val="tx1"/>
-                </a:solidFill>
-                <a:latin typeface="+mj-lt"/>
-                <a:ea typeface="+mj-ea"/>
-                <a:cs typeface="+mj-cs"/>
-              </a:defRPr>
-            </a:lvl1pPr>
-          </a:lstStyle>
-          <a:p>
-            <a:pPr>
-              <a:lnSpc>
-                <a:spcPct val="80000"/>
-              </a:lnSpc>
-              <a:tabLst>
-                <a:tab pos="0" algn="l"/>
-              </a:tabLst>
-            </a:pPr>
-            <a:r>
-              <a:rPr lang="ru-RU" sz="2400" b="1" dirty="0">
-                <a:solidFill>
-                  <a:srgbClr val="FF9400"/>
-                </a:solidFill>
-                <a:latin typeface="Arial"/>
-              </a:rPr>
-              <a:t>Анализ существующих аналогов</a:t>
-            </a:r>
-            <a:endParaRPr lang="en-US" sz="2400" dirty="0">
-              <a:solidFill>
-                <a:srgbClr val="000000"/>
-              </a:solidFill>
-              <a:latin typeface="Arial"/>
-            </a:endParaRPr>
-          </a:p>
-        </p:txBody>
-      </p:sp>
-      <p:pic>
-        <p:nvPicPr>
-          <p:cNvPr id="3" name="Рисунок 2">
-            <a:extLst>
-              <a:ext uri="{FF2B5EF4-FFF2-40B4-BE49-F238E27FC236}">
-                <a16:creationId xmlns:a16="http://schemas.microsoft.com/office/drawing/2014/main" id="{B262BCA1-636C-4B6A-8046-D5B02220F911}"/>
+                <a16:creationId xmlns:a16="http://schemas.microsoft.com/office/drawing/2014/main" id="{D57AE50B-4A22-4278-B31F-71474D59E5E5}"/>
               </a:ext>
             </a:extLst>
           </p:cNvPr>
@@ -8842,8 +8707,8 @@
         </p:blipFill>
         <p:spPr>
           <a:xfrm>
-            <a:off x="1324936" y="908045"/>
-            <a:ext cx="2019091" cy="664831"/>
+            <a:off x="4180572" y="973240"/>
+            <a:ext cx="1615369" cy="531897"/>
           </a:xfrm>
           <a:prstGeom prst="rect">
             <a:avLst/>
@@ -8852,10 +8717,10 @@
       </p:pic>
       <p:pic>
         <p:nvPicPr>
-          <p:cNvPr id="4" name="Рисунок 3">
+          <p:cNvPr id="6" name="Рисунок 5">
             <a:extLst>
               <a:ext uri="{FF2B5EF4-FFF2-40B4-BE49-F238E27FC236}">
-                <a16:creationId xmlns:a16="http://schemas.microsoft.com/office/drawing/2014/main" id="{3B999582-0116-4F1E-8BDA-36E5C5AFF8FF}"/>
+                <a16:creationId xmlns:a16="http://schemas.microsoft.com/office/drawing/2014/main" id="{B2C65E3B-D09C-48EE-BEAD-75817AE92E7E}"/>
               </a:ext>
             </a:extLst>
           </p:cNvPr>
@@ -8877,8 +8742,8 @@
         </p:blipFill>
         <p:spPr bwMode="auto">
           <a:xfrm>
-            <a:off x="1512755" y="1711504"/>
-            <a:ext cx="1643452" cy="2933283"/>
+            <a:off x="4223982" y="1505137"/>
+            <a:ext cx="1528550" cy="2728203"/>
           </a:xfrm>
           <a:prstGeom prst="rect">
             <a:avLst/>
@@ -8891,10 +8756,10 @@
       </p:pic>
       <p:pic>
         <p:nvPicPr>
-          <p:cNvPr id="5" name="Рисунок 4">
+          <p:cNvPr id="7" name="Рисунок 6">
             <a:extLst>
               <a:ext uri="{FF2B5EF4-FFF2-40B4-BE49-F238E27FC236}">
-                <a16:creationId xmlns:a16="http://schemas.microsoft.com/office/drawing/2014/main" id="{81EAC54E-9658-4003-B6C0-84A8DC4CD9AE}"/>
+                <a16:creationId xmlns:a16="http://schemas.microsoft.com/office/drawing/2014/main" id="{E2DBD1B6-932E-4038-AAC0-558DD4883E14}"/>
               </a:ext>
             </a:extLst>
           </p:cNvPr>
@@ -8909,8 +8774,8 @@
         </p:blipFill>
         <p:spPr>
           <a:xfrm>
-            <a:off x="4384180" y="908045"/>
-            <a:ext cx="2019091" cy="667338"/>
+            <a:off x="6119131" y="973240"/>
+            <a:ext cx="1615370" cy="533903"/>
           </a:xfrm>
           <a:prstGeom prst="rect">
             <a:avLst/>
@@ -8919,10 +8784,10 @@
       </p:pic>
       <p:pic>
         <p:nvPicPr>
-          <p:cNvPr id="6" name="Рисунок 5">
+          <p:cNvPr id="8" name="Рисунок 7">
             <a:extLst>
               <a:ext uri="{FF2B5EF4-FFF2-40B4-BE49-F238E27FC236}">
-                <a16:creationId xmlns:a16="http://schemas.microsoft.com/office/drawing/2014/main" id="{B89E9190-3D70-4FCD-988F-C3F8BB8A8396}"/>
+                <a16:creationId xmlns:a16="http://schemas.microsoft.com/office/drawing/2014/main" id="{E712DC60-15B2-4F32-B950-1456C8671976}"/>
               </a:ext>
             </a:extLst>
           </p:cNvPr>
@@ -8944,8 +8809,8 @@
         </p:blipFill>
         <p:spPr bwMode="auto">
           <a:xfrm>
-            <a:off x="4578500" y="1708348"/>
-            <a:ext cx="1643452" cy="2921956"/>
+            <a:off x="6197497" y="1510405"/>
+            <a:ext cx="1528549" cy="2717665"/>
           </a:xfrm>
           <a:prstGeom prst="rect">
             <a:avLst/>
@@ -8956,162 +8821,7 @@
           </a:ln>
         </p:spPr>
       </p:pic>
-      <p:sp>
-        <p:nvSpPr>
-          <p:cNvPr id="7" name="PlaceHolder 2">
-            <a:extLst>
-              <a:ext uri="{FF2B5EF4-FFF2-40B4-BE49-F238E27FC236}">
-                <a16:creationId xmlns:a16="http://schemas.microsoft.com/office/drawing/2014/main" id="{F86F0C51-3082-4B4C-B51D-5F8F41387DA2}"/>
-              </a:ext>
-            </a:extLst>
-          </p:cNvPr>
-          <p:cNvSpPr txBox="1">
-            <a:spLocks/>
-          </p:cNvSpPr>
-          <p:nvPr/>
-        </p:nvSpPr>
-        <p:spPr>
-          <a:xfrm>
-            <a:off x="8704080" y="4816440"/>
-            <a:ext cx="203040" cy="142200"/>
-          </a:xfrm>
-          <a:prstGeom prst="rect">
-            <a:avLst/>
-          </a:prstGeom>
-          <a:noFill/>
-          <a:ln w="0">
-            <a:noFill/>
-          </a:ln>
-        </p:spPr>
-        <p:txBody>
-          <a:bodyPr lIns="19080" tIns="19080" rIns="19080" bIns="19080" anchor="t">
-            <a:noAutofit/>
-          </a:bodyPr>
-          <a:lstStyle>
-            <a:defPPr>
-              <a:defRPr lang="ru-RU"/>
-            </a:defPPr>
-            <a:lvl1pPr marL="0" indent="0" algn="r" defTabSz="914400" rtl="0" eaLnBrk="1" latinLnBrk="0" hangingPunct="1">
-              <a:lnSpc>
-                <a:spcPct val="100000"/>
-              </a:lnSpc>
-              <a:buNone/>
-              <a:tabLst>
-                <a:tab pos="0" algn="l"/>
-              </a:tabLst>
-              <a:defRPr lang="ru" sz="1100" b="0" u="none" strike="noStrike" kern="1200">
-                <a:solidFill>
-                  <a:srgbClr val="4D4E4F"/>
-                </a:solidFill>
-                <a:effectLst/>
-                <a:uFillTx/>
-                <a:latin typeface="Arial"/>
-                <a:ea typeface="Arial"/>
-                <a:cs typeface="+mn-cs"/>
-              </a:defRPr>
-            </a:lvl1pPr>
-            <a:lvl2pPr marL="457200" algn="l" defTabSz="914400" rtl="0" eaLnBrk="1" latinLnBrk="0" hangingPunct="1">
-              <a:defRPr sz="1800" kern="1200">
-                <a:solidFill>
-                  <a:schemeClr val="tx1"/>
-                </a:solidFill>
-                <a:latin typeface="+mn-lt"/>
-                <a:ea typeface="+mn-ea"/>
-                <a:cs typeface="+mn-cs"/>
-              </a:defRPr>
-            </a:lvl2pPr>
-            <a:lvl3pPr marL="914400" algn="l" defTabSz="914400" rtl="0" eaLnBrk="1" latinLnBrk="0" hangingPunct="1">
-              <a:defRPr sz="1800" kern="1200">
-                <a:solidFill>
-                  <a:schemeClr val="tx1"/>
-                </a:solidFill>
-                <a:latin typeface="+mn-lt"/>
-                <a:ea typeface="+mn-ea"/>
-                <a:cs typeface="+mn-cs"/>
-              </a:defRPr>
-            </a:lvl3pPr>
-            <a:lvl4pPr marL="1371600" algn="l" defTabSz="914400" rtl="0" eaLnBrk="1" latinLnBrk="0" hangingPunct="1">
-              <a:defRPr sz="1800" kern="1200">
-                <a:solidFill>
-                  <a:schemeClr val="tx1"/>
-                </a:solidFill>
-                <a:latin typeface="+mn-lt"/>
-                <a:ea typeface="+mn-ea"/>
-                <a:cs typeface="+mn-cs"/>
-              </a:defRPr>
-            </a:lvl4pPr>
-            <a:lvl5pPr marL="1828800" algn="l" defTabSz="914400" rtl="0" eaLnBrk="1" latinLnBrk="0" hangingPunct="1">
-              <a:defRPr sz="1800" kern="1200">
-                <a:solidFill>
-                  <a:schemeClr val="tx1"/>
-                </a:solidFill>
-                <a:latin typeface="+mn-lt"/>
-                <a:ea typeface="+mn-ea"/>
-                <a:cs typeface="+mn-cs"/>
-              </a:defRPr>
-            </a:lvl5pPr>
-            <a:lvl6pPr marL="2286000" algn="l" defTabSz="914400" rtl="0" eaLnBrk="1" latinLnBrk="0" hangingPunct="1">
-              <a:defRPr sz="1800" kern="1200">
-                <a:solidFill>
-                  <a:schemeClr val="tx1"/>
-                </a:solidFill>
-                <a:latin typeface="+mn-lt"/>
-                <a:ea typeface="+mn-ea"/>
-                <a:cs typeface="+mn-cs"/>
-              </a:defRPr>
-            </a:lvl6pPr>
-            <a:lvl7pPr marL="2743200" algn="l" defTabSz="914400" rtl="0" eaLnBrk="1" latinLnBrk="0" hangingPunct="1">
-              <a:defRPr sz="1800" kern="1200">
-                <a:solidFill>
-                  <a:schemeClr val="tx1"/>
-                </a:solidFill>
-                <a:latin typeface="+mn-lt"/>
-                <a:ea typeface="+mn-ea"/>
-                <a:cs typeface="+mn-cs"/>
-              </a:defRPr>
-            </a:lvl7pPr>
-            <a:lvl8pPr marL="3200400" algn="l" defTabSz="914400" rtl="0" eaLnBrk="1" latinLnBrk="0" hangingPunct="1">
-              <a:defRPr sz="1800" kern="1200">
-                <a:solidFill>
-                  <a:schemeClr val="tx1"/>
-                </a:solidFill>
-                <a:latin typeface="+mn-lt"/>
-                <a:ea typeface="+mn-ea"/>
-                <a:cs typeface="+mn-cs"/>
-              </a:defRPr>
-            </a:lvl8pPr>
-            <a:lvl9pPr marL="3657600" algn="l" defTabSz="914400" rtl="0" eaLnBrk="1" latinLnBrk="0" hangingPunct="1">
-              <a:defRPr sz="1800" kern="1200">
-                <a:solidFill>
-                  <a:schemeClr val="tx1"/>
-                </a:solidFill>
-                <a:latin typeface="+mn-lt"/>
-                <a:ea typeface="+mn-ea"/>
-                <a:cs typeface="+mn-cs"/>
-              </a:defRPr>
-            </a:lvl9pPr>
-          </a:lstStyle>
-          <a:p>
-            <a:fld id="{A784A474-F8F9-4DC5-8AFE-6638820E2D4C}" type="slidenum">
-              <a:rPr lang="ru-RU" smtClean="0"/>
-              <a:pPr/>
-              <a:t>7</a:t>
-            </a:fld>
-            <a:endParaRPr lang="ru-RU" dirty="0">
-              <a:solidFill>
-                <a:srgbClr val="000000"/>
-              </a:solidFill>
-              <a:latin typeface="Times New Roman"/>
-            </a:endParaRPr>
-          </a:p>
-        </p:txBody>
-      </p:sp>
     </p:spTree>
-    <p:extLst>
-      <p:ext uri="{BB962C8B-B14F-4D97-AF65-F5344CB8AC3E}">
-        <p14:creationId xmlns:p14="http://schemas.microsoft.com/office/powerpoint/2010/main" val="2256336371"/>
-      </p:ext>
-    </p:extLst>
   </p:cSld>
   <p:clrMapOvr>
     <a:masterClrMapping/>
@@ -9119,7 +8829,7 @@
 </p:sld>
 </file>
 
-<file path=ppt/slides/slide8.xml><?xml version="1.0" encoding="utf-8"?>
+<file path=ppt/slides/slide7.xml><?xml version="1.0" encoding="utf-8"?>
 <p:sld xmlns:a="http://schemas.openxmlformats.org/drawingml/2006/main" xmlns:r="http://schemas.openxmlformats.org/officeDocument/2006/relationships" xmlns:p="http://schemas.openxmlformats.org/presentationml/2006/main">
   <p:cSld>
     <p:spTree>
@@ -9264,7 +8974,7 @@
                 <a:latin typeface="Arial"/>
                 <a:ea typeface="Arial"/>
               </a:rPr>
-              <a:t>8</a:t>
+              <a:t>7</a:t>
             </a:fld>
             <a:endParaRPr lang="en-US" sz="1100" b="0" u="none" strike="noStrike" dirty="0">
               <a:solidFill>
@@ -9482,60 +9192,6 @@
               </a:rPr>
               <a:t>);</a:t>
             </a:r>
-            <a:endParaRPr lang="en-US" sz="2000" b="0" u="none" strike="noStrike" dirty="0">
-              <a:solidFill>
-                <a:srgbClr val="000000"/>
-              </a:solidFill>
-              <a:effectLst/>
-              <a:uFillTx/>
-              <a:latin typeface="Arial"/>
-            </a:endParaRPr>
-          </a:p>
-          <a:p>
-            <a:pPr marL="216000" indent="-216000">
-              <a:lnSpc>
-                <a:spcPct val="120000"/>
-              </a:lnSpc>
-              <a:buClr>
-                <a:srgbClr val="000000"/>
-              </a:buClr>
-              <a:buSzPct val="45000"/>
-              <a:buFont typeface="Wingdings" charset="2"/>
-              <a:buChar char=""/>
-              <a:tabLst>
-                <a:tab pos="0" algn="l"/>
-              </a:tabLst>
-            </a:pPr>
-            <a:r>
-              <a:rPr lang="ru" sz="2000" b="0" u="none" strike="noStrike" dirty="0">
-                <a:solidFill>
-                  <a:srgbClr val="FF0000"/>
-                </a:solidFill>
-                <a:effectLst/>
-                <a:uFillTx/>
-                <a:latin typeface="Arial"/>
-                <a:ea typeface="Arial"/>
-              </a:rPr>
-              <a:t>Развитие языка.</a:t>
-            </a:r>
-            <a:endParaRPr lang="en-US" sz="2000" b="0" u="none" strike="noStrike" dirty="0">
-              <a:solidFill>
-                <a:srgbClr val="FF0000"/>
-              </a:solidFill>
-              <a:effectLst/>
-              <a:uFillTx/>
-              <a:latin typeface="Arial"/>
-            </a:endParaRPr>
-          </a:p>
-          <a:p>
-            <a:pPr>
-              <a:lnSpc>
-                <a:spcPct val="120000"/>
-              </a:lnSpc>
-              <a:tabLst>
-                <a:tab pos="0" algn="l"/>
-              </a:tabLst>
-            </a:pPr>
             <a:endParaRPr lang="en-US" sz="2000" b="0" u="none" strike="noStrike" dirty="0">
               <a:solidFill>
                 <a:srgbClr val="000000"/>
@@ -9603,7 +9259,7 @@
 </p:sld>
 </file>
 
-<file path=ppt/slides/slide9.xml><?xml version="1.0" encoding="utf-8"?>
+<file path=ppt/slides/slide8.xml><?xml version="1.0" encoding="utf-8"?>
 <p:sld xmlns:a="http://schemas.openxmlformats.org/drawingml/2006/main" xmlns:r="http://schemas.openxmlformats.org/officeDocument/2006/relationships" xmlns:p="http://schemas.openxmlformats.org/presentationml/2006/main">
   <p:cSld>
     <p:spTree>
@@ -9717,15 +9373,6 @@
               </a:rPr>
               <a:t>bevy_quinnet</a:t>
             </a:r>
-            <a:r>
-              <a:rPr lang="en-US" sz="2400" b="1" dirty="0">
-                <a:solidFill>
-                  <a:srgbClr val="FF9400"/>
-                </a:solidFill>
-                <a:ea typeface="Arial"/>
-              </a:rPr>
-              <a:t> + QUIC</a:t>
-            </a:r>
             <a:endParaRPr lang="en-US" sz="2400" dirty="0">
               <a:solidFill>
                 <a:srgbClr val="000000"/>
@@ -10080,7 +9727,7 @@
             <a:fld id="{76994A23-3ABE-4C2C-AD97-0B67B0B8959B}" type="slidenum">
               <a:rPr lang="ru-RU" smtClean="0"/>
               <a:pPr/>
-              <a:t>9</a:t>
+              <a:t>8</a:t>
             </a:fld>
             <a:endParaRPr lang="ru-RU" dirty="0">
               <a:solidFill>
@@ -10097,6 +9744,223 @@
         <p14:creationId xmlns:p14="http://schemas.microsoft.com/office/powerpoint/2010/main" val="1226420949"/>
       </p:ext>
     </p:extLst>
+  </p:cSld>
+  <p:clrMapOvr>
+    <a:masterClrMapping/>
+  </p:clrMapOvr>
+</p:sld>
+</file>
+
+<file path=ppt/slides/slide9.xml><?xml version="1.0" encoding="utf-8"?>
+<p:sld xmlns:a="http://schemas.openxmlformats.org/drawingml/2006/main" xmlns:r="http://schemas.openxmlformats.org/officeDocument/2006/relationships" xmlns:p="http://schemas.openxmlformats.org/presentationml/2006/main">
+  <p:cSld>
+    <p:spTree>
+      <p:nvGrpSpPr>
+        <p:cNvPr id="1" name=""/>
+        <p:cNvGrpSpPr/>
+        <p:nvPr/>
+      </p:nvGrpSpPr>
+      <p:grpSpPr>
+        <a:xfrm>
+          <a:off x="0" y="0"/>
+          <a:ext cx="0" cy="0"/>
+          <a:chOff x="0" y="0"/>
+          <a:chExt cx="0" cy="0"/>
+        </a:xfrm>
+      </p:grpSpPr>
+      <p:sp>
+        <p:nvSpPr>
+          <p:cNvPr id="53" name="PlaceHolder 1"/>
+          <p:cNvSpPr>
+            <a:spLocks noGrp="1"/>
+          </p:cNvSpPr>
+          <p:nvPr>
+            <p:ph type="title"/>
+          </p:nvPr>
+        </p:nvSpPr>
+        <p:spPr>
+          <a:xfrm>
+            <a:off x="442800" y="337680"/>
+            <a:ext cx="6252840" cy="437400"/>
+          </a:xfrm>
+          <a:prstGeom prst="rect">
+            <a:avLst/>
+          </a:prstGeom>
+          <a:noFill/>
+          <a:ln w="0">
+            <a:noFill/>
+          </a:ln>
+        </p:spPr>
+        <p:txBody>
+          <a:bodyPr lIns="19080" tIns="19080" rIns="19080" bIns="19080" anchor="t">
+            <a:noAutofit/>
+          </a:bodyPr>
+          <a:lstStyle/>
+          <a:p>
+            <a:pPr indent="0">
+              <a:lnSpc>
+                <a:spcPct val="80000"/>
+              </a:lnSpc>
+              <a:buNone/>
+              <a:tabLst>
+                <a:tab pos="0" algn="l"/>
+              </a:tabLst>
+            </a:pPr>
+            <a:r>
+              <a:rPr lang="ru-RU" sz="2400" b="1" u="none" strike="noStrike" dirty="0">
+                <a:solidFill>
+                  <a:srgbClr val="FF9400"/>
+                </a:solidFill>
+                <a:effectLst/>
+                <a:uFillTx/>
+                <a:latin typeface="Arial"/>
+                <a:ea typeface="Arial"/>
+              </a:rPr>
+              <a:t>Структура </a:t>
+            </a:r>
+            <a:r>
+              <a:rPr lang="en-US" sz="2400" b="1" u="none" strike="noStrike" dirty="0">
+                <a:solidFill>
+                  <a:srgbClr val="FF9400"/>
+                </a:solidFill>
+                <a:effectLst/>
+                <a:uFillTx/>
+                <a:latin typeface="Arial"/>
+                <a:ea typeface="Arial"/>
+              </a:rPr>
+              <a:t>ECS</a:t>
+            </a:r>
+            <a:endParaRPr lang="en-US" sz="2400" b="0" u="none" strike="noStrike" dirty="0">
+              <a:solidFill>
+                <a:srgbClr val="000000"/>
+              </a:solidFill>
+              <a:effectLst/>
+              <a:uFillTx/>
+              <a:latin typeface="Arial"/>
+            </a:endParaRPr>
+          </a:p>
+        </p:txBody>
+      </p:sp>
+      <p:sp>
+        <p:nvSpPr>
+          <p:cNvPr id="54" name="PlaceHolder 2"/>
+          <p:cNvSpPr>
+            <a:spLocks noGrp="1"/>
+          </p:cNvSpPr>
+          <p:nvPr>
+            <p:ph type="sldNum" idx="11"/>
+          </p:nvPr>
+        </p:nvSpPr>
+        <p:spPr>
+          <a:xfrm>
+            <a:off x="8704080" y="4816440"/>
+            <a:ext cx="203040" cy="142200"/>
+          </a:xfrm>
+          <a:prstGeom prst="rect">
+            <a:avLst/>
+          </a:prstGeom>
+          <a:noFill/>
+          <a:ln w="0">
+            <a:noFill/>
+          </a:ln>
+        </p:spPr>
+        <p:txBody>
+          <a:bodyPr lIns="19080" tIns="19080" rIns="19080" bIns="19080" anchor="t">
+            <a:noAutofit/>
+          </a:bodyPr>
+          <a:lstStyle>
+            <a:lvl1pPr indent="0" algn="r">
+              <a:lnSpc>
+                <a:spcPct val="100000"/>
+              </a:lnSpc>
+              <a:buNone/>
+              <a:tabLst>
+                <a:tab pos="0" algn="l"/>
+              </a:tabLst>
+              <a:defRPr lang="ru" sz="1100" b="0" u="none" strike="noStrike">
+                <a:solidFill>
+                  <a:srgbClr val="4D4E4F"/>
+                </a:solidFill>
+                <a:effectLst/>
+                <a:uFillTx/>
+                <a:latin typeface="Arial"/>
+                <a:ea typeface="Arial"/>
+              </a:defRPr>
+            </a:lvl1pPr>
+          </a:lstStyle>
+          <a:p>
+            <a:pPr indent="0" algn="r">
+              <a:lnSpc>
+                <a:spcPct val="100000"/>
+              </a:lnSpc>
+              <a:buNone/>
+              <a:tabLst>
+                <a:tab pos="0" algn="l"/>
+              </a:tabLst>
+            </a:pPr>
+            <a:fld id="{6D3636B9-FACD-4729-959E-76A3CB26FC1F}" type="slidenum">
+              <a:rPr lang="ru" sz="1100" b="0" u="none" strike="noStrike">
+                <a:solidFill>
+                  <a:srgbClr val="4D4E4F"/>
+                </a:solidFill>
+                <a:effectLst/>
+                <a:uFillTx/>
+                <a:latin typeface="Arial"/>
+                <a:ea typeface="Arial"/>
+              </a:rPr>
+              <a:t>9</a:t>
+            </a:fld>
+            <a:endParaRPr lang="en-US" sz="1100" b="0" u="none" strike="noStrike">
+              <a:solidFill>
+                <a:srgbClr val="000000"/>
+              </a:solidFill>
+              <a:effectLst/>
+              <a:uFillTx/>
+              <a:latin typeface="Times New Roman"/>
+            </a:endParaRPr>
+          </a:p>
+        </p:txBody>
+      </p:sp>
+      <p:pic>
+        <p:nvPicPr>
+          <p:cNvPr id="5" name="Рисунок 4">
+            <a:extLst>
+              <a:ext uri="{FF2B5EF4-FFF2-40B4-BE49-F238E27FC236}">
+                <a16:creationId xmlns:a16="http://schemas.microsoft.com/office/drawing/2014/main" id="{88447011-8329-4B87-94F5-24169167ABF0}"/>
+              </a:ext>
+            </a:extLst>
+          </p:cNvPr>
+          <p:cNvPicPr/>
+          <p:nvPr/>
+        </p:nvPicPr>
+        <p:blipFill>
+          <a:blip r:embed="rId2">
+            <a:extLst>
+              <a:ext uri="{28A0092B-C50C-407E-A947-70E740481C1C}">
+                <a14:useLocalDpi xmlns:a14="http://schemas.microsoft.com/office/drawing/2010/main" val="0"/>
+              </a:ext>
+            </a:extLst>
+          </a:blip>
+          <a:srcRect/>
+          <a:stretch>
+            <a:fillRect/>
+          </a:stretch>
+        </p:blipFill>
+        <p:spPr bwMode="auto">
+          <a:xfrm>
+            <a:off x="1604962" y="1704975"/>
+            <a:ext cx="5934075" cy="1733550"/>
+          </a:xfrm>
+          <a:prstGeom prst="rect">
+            <a:avLst/>
+          </a:prstGeom>
+          <a:noFill/>
+          <a:ln>
+            <a:noFill/>
+          </a:ln>
+        </p:spPr>
+      </p:pic>
+    </p:spTree>
   </p:cSld>
   <p:clrMapOvr>
     <a:masterClrMapping/>

</xml_diff>

<commit_message>
sm chnges [Ready to print]
</commit_message>
<xml_diff>
--- a/docs/Result/Презентация.pptx
+++ b/docs/Result/Презентация.pptx
@@ -14,14 +14,13 @@
     <p:sldId id="268" r:id="rId8"/>
     <p:sldId id="258" r:id="rId9"/>
     <p:sldId id="259" r:id="rId10"/>
-    <p:sldId id="269" r:id="rId11"/>
-    <p:sldId id="260" r:id="rId12"/>
-    <p:sldId id="270" r:id="rId13"/>
-    <p:sldId id="271" r:id="rId14"/>
-    <p:sldId id="261" r:id="rId15"/>
-    <p:sldId id="262" r:id="rId16"/>
-    <p:sldId id="263" r:id="rId17"/>
-    <p:sldId id="264" r:id="rId18"/>
+    <p:sldId id="260" r:id="rId11"/>
+    <p:sldId id="270" r:id="rId12"/>
+    <p:sldId id="271" r:id="rId13"/>
+    <p:sldId id="261" r:id="rId14"/>
+    <p:sldId id="262" r:id="rId15"/>
+    <p:sldId id="263" r:id="rId16"/>
+    <p:sldId id="264" r:id="rId17"/>
   </p:sldIdLst>
   <p:sldSz cx="9144000" cy="5143500" type="screen16x9"/>
   <p:notesSz cx="7772400" cy="10058400"/>
@@ -4943,380 +4942,6 @@
           <p:cNvPr id="2" name="PlaceHolder 1">
             <a:extLst>
               <a:ext uri="{FF2B5EF4-FFF2-40B4-BE49-F238E27FC236}">
-                <a16:creationId xmlns:a16="http://schemas.microsoft.com/office/drawing/2014/main" id="{DCF9F8F2-C936-4715-BA43-D9419DF9C869}"/>
-              </a:ext>
-            </a:extLst>
-          </p:cNvPr>
-          <p:cNvSpPr txBox="1">
-            <a:spLocks/>
-          </p:cNvSpPr>
-          <p:nvPr/>
-        </p:nvSpPr>
-        <p:spPr>
-          <a:xfrm>
-            <a:off x="442800" y="337680"/>
-            <a:ext cx="6252840" cy="437400"/>
-          </a:xfrm>
-          <a:prstGeom prst="rect">
-            <a:avLst/>
-          </a:prstGeom>
-          <a:noFill/>
-          <a:ln w="0">
-            <a:noFill/>
-          </a:ln>
-        </p:spPr>
-        <p:txBody>
-          <a:bodyPr lIns="19080" tIns="19080" rIns="19080" bIns="19080" anchor="t">
-            <a:noAutofit/>
-          </a:bodyPr>
-          <a:lstStyle>
-            <a:lvl1pPr algn="l" defTabSz="914400" rtl="0" eaLnBrk="1" latinLnBrk="0" hangingPunct="1">
-              <a:lnSpc>
-                <a:spcPct val="90000"/>
-              </a:lnSpc>
-              <a:spcBef>
-                <a:spcPct val="0"/>
-              </a:spcBef>
-              <a:buNone/>
-              <a:defRPr sz="4400" kern="1200">
-                <a:solidFill>
-                  <a:schemeClr val="tx1"/>
-                </a:solidFill>
-                <a:latin typeface="+mj-lt"/>
-                <a:ea typeface="+mj-ea"/>
-                <a:cs typeface="+mj-cs"/>
-              </a:defRPr>
-            </a:lvl1pPr>
-          </a:lstStyle>
-          <a:p>
-            <a:pPr>
-              <a:lnSpc>
-                <a:spcPct val="80000"/>
-              </a:lnSpc>
-              <a:tabLst>
-                <a:tab pos="0" algn="l"/>
-              </a:tabLst>
-            </a:pPr>
-            <a:r>
-              <a:rPr lang="ru-RU" sz="2400" b="1" dirty="0">
-                <a:solidFill>
-                  <a:srgbClr val="FF9400"/>
-                </a:solidFill>
-                <a:latin typeface="Arial"/>
-              </a:rPr>
-              <a:t>Архитектура клиента</a:t>
-            </a:r>
-            <a:endParaRPr lang="en-US" sz="2400" dirty="0">
-              <a:solidFill>
-                <a:srgbClr val="000000"/>
-              </a:solidFill>
-              <a:latin typeface="Arial"/>
-            </a:endParaRPr>
-          </a:p>
-        </p:txBody>
-      </p:sp>
-      <p:sp>
-        <p:nvSpPr>
-          <p:cNvPr id="3" name="PlaceHolder 2">
-            <a:extLst>
-              <a:ext uri="{FF2B5EF4-FFF2-40B4-BE49-F238E27FC236}">
-                <a16:creationId xmlns:a16="http://schemas.microsoft.com/office/drawing/2014/main" id="{BA95EA29-E22E-4B6C-AF0F-429C0485ACB8}"/>
-              </a:ext>
-            </a:extLst>
-          </p:cNvPr>
-          <p:cNvSpPr txBox="1">
-            <a:spLocks/>
-          </p:cNvSpPr>
-          <p:nvPr/>
-        </p:nvSpPr>
-        <p:spPr>
-          <a:xfrm>
-            <a:off x="8704080" y="4816440"/>
-            <a:ext cx="203040" cy="142200"/>
-          </a:xfrm>
-          <a:prstGeom prst="rect">
-            <a:avLst/>
-          </a:prstGeom>
-          <a:noFill/>
-          <a:ln w="0">
-            <a:noFill/>
-          </a:ln>
-        </p:spPr>
-        <p:txBody>
-          <a:bodyPr lIns="19080" tIns="19080" rIns="19080" bIns="19080" anchor="t">
-            <a:noAutofit/>
-          </a:bodyPr>
-          <a:lstStyle>
-            <a:defPPr>
-              <a:defRPr lang="ru-RU"/>
-            </a:defPPr>
-            <a:lvl1pPr marL="0" indent="0" algn="r" defTabSz="914400" rtl="0" eaLnBrk="1" latinLnBrk="0" hangingPunct="1">
-              <a:lnSpc>
-                <a:spcPct val="100000"/>
-              </a:lnSpc>
-              <a:buNone/>
-              <a:tabLst>
-                <a:tab pos="0" algn="l"/>
-              </a:tabLst>
-              <a:defRPr lang="ru" sz="1100" b="0" u="none" strike="noStrike" kern="1200">
-                <a:solidFill>
-                  <a:srgbClr val="4D4E4F"/>
-                </a:solidFill>
-                <a:effectLst/>
-                <a:uFillTx/>
-                <a:latin typeface="Arial"/>
-                <a:ea typeface="Arial"/>
-                <a:cs typeface="+mn-cs"/>
-              </a:defRPr>
-            </a:lvl1pPr>
-            <a:lvl2pPr marL="457200" algn="l" defTabSz="914400" rtl="0" eaLnBrk="1" latinLnBrk="0" hangingPunct="1">
-              <a:defRPr sz="1800" kern="1200">
-                <a:solidFill>
-                  <a:schemeClr val="tx1"/>
-                </a:solidFill>
-                <a:latin typeface="+mn-lt"/>
-                <a:ea typeface="+mn-ea"/>
-                <a:cs typeface="+mn-cs"/>
-              </a:defRPr>
-            </a:lvl2pPr>
-            <a:lvl3pPr marL="914400" algn="l" defTabSz="914400" rtl="0" eaLnBrk="1" latinLnBrk="0" hangingPunct="1">
-              <a:defRPr sz="1800" kern="1200">
-                <a:solidFill>
-                  <a:schemeClr val="tx1"/>
-                </a:solidFill>
-                <a:latin typeface="+mn-lt"/>
-                <a:ea typeface="+mn-ea"/>
-                <a:cs typeface="+mn-cs"/>
-              </a:defRPr>
-            </a:lvl3pPr>
-            <a:lvl4pPr marL="1371600" algn="l" defTabSz="914400" rtl="0" eaLnBrk="1" latinLnBrk="0" hangingPunct="1">
-              <a:defRPr sz="1800" kern="1200">
-                <a:solidFill>
-                  <a:schemeClr val="tx1"/>
-                </a:solidFill>
-                <a:latin typeface="+mn-lt"/>
-                <a:ea typeface="+mn-ea"/>
-                <a:cs typeface="+mn-cs"/>
-              </a:defRPr>
-            </a:lvl4pPr>
-            <a:lvl5pPr marL="1828800" algn="l" defTabSz="914400" rtl="0" eaLnBrk="1" latinLnBrk="0" hangingPunct="1">
-              <a:defRPr sz="1800" kern="1200">
-                <a:solidFill>
-                  <a:schemeClr val="tx1"/>
-                </a:solidFill>
-                <a:latin typeface="+mn-lt"/>
-                <a:ea typeface="+mn-ea"/>
-                <a:cs typeface="+mn-cs"/>
-              </a:defRPr>
-            </a:lvl5pPr>
-            <a:lvl6pPr marL="2286000" algn="l" defTabSz="914400" rtl="0" eaLnBrk="1" latinLnBrk="0" hangingPunct="1">
-              <a:defRPr sz="1800" kern="1200">
-                <a:solidFill>
-                  <a:schemeClr val="tx1"/>
-                </a:solidFill>
-                <a:latin typeface="+mn-lt"/>
-                <a:ea typeface="+mn-ea"/>
-                <a:cs typeface="+mn-cs"/>
-              </a:defRPr>
-            </a:lvl6pPr>
-            <a:lvl7pPr marL="2743200" algn="l" defTabSz="914400" rtl="0" eaLnBrk="1" latinLnBrk="0" hangingPunct="1">
-              <a:defRPr sz="1800" kern="1200">
-                <a:solidFill>
-                  <a:schemeClr val="tx1"/>
-                </a:solidFill>
-                <a:latin typeface="+mn-lt"/>
-                <a:ea typeface="+mn-ea"/>
-                <a:cs typeface="+mn-cs"/>
-              </a:defRPr>
-            </a:lvl7pPr>
-            <a:lvl8pPr marL="3200400" algn="l" defTabSz="914400" rtl="0" eaLnBrk="1" latinLnBrk="0" hangingPunct="1">
-              <a:defRPr sz="1800" kern="1200">
-                <a:solidFill>
-                  <a:schemeClr val="tx1"/>
-                </a:solidFill>
-                <a:latin typeface="+mn-lt"/>
-                <a:ea typeface="+mn-ea"/>
-                <a:cs typeface="+mn-cs"/>
-              </a:defRPr>
-            </a:lvl8pPr>
-            <a:lvl9pPr marL="3657600" algn="l" defTabSz="914400" rtl="0" eaLnBrk="1" latinLnBrk="0" hangingPunct="1">
-              <a:defRPr sz="1800" kern="1200">
-                <a:solidFill>
-                  <a:schemeClr val="tx1"/>
-                </a:solidFill>
-                <a:latin typeface="+mn-lt"/>
-                <a:ea typeface="+mn-ea"/>
-                <a:cs typeface="+mn-cs"/>
-              </a:defRPr>
-            </a:lvl9pPr>
-          </a:lstStyle>
-          <a:p>
-            <a:fld id="{A784A474-F8F9-4DC5-8AFE-6638820E2D4C}" type="slidenum">
-              <a:rPr lang="ru-RU" smtClean="0"/>
-              <a:pPr/>
-              <a:t>10</a:t>
-            </a:fld>
-            <a:endParaRPr lang="ru-RU" dirty="0">
-              <a:solidFill>
-                <a:srgbClr val="000000"/>
-              </a:solidFill>
-              <a:latin typeface="Times New Roman"/>
-            </a:endParaRPr>
-          </a:p>
-        </p:txBody>
-      </p:sp>
-      <p:pic>
-        <p:nvPicPr>
-          <p:cNvPr id="4" name="Рисунок 3">
-            <a:extLst>
-              <a:ext uri="{FF2B5EF4-FFF2-40B4-BE49-F238E27FC236}">
-                <a16:creationId xmlns:a16="http://schemas.microsoft.com/office/drawing/2014/main" id="{C7712F22-9C22-41BA-80E5-DDC49219E1EA}"/>
-              </a:ext>
-            </a:extLst>
-          </p:cNvPr>
-          <p:cNvPicPr/>
-          <p:nvPr/>
-        </p:nvPicPr>
-        <p:blipFill>
-          <a:blip r:embed="rId2" cstate="print">
-            <a:extLst>
-              <a:ext uri="{28A0092B-C50C-407E-A947-70E740481C1C}">
-                <a14:useLocalDpi xmlns:a14="http://schemas.microsoft.com/office/drawing/2010/main" val="0"/>
-              </a:ext>
-            </a:extLst>
-          </a:blip>
-          <a:srcRect/>
-          <a:stretch>
-            <a:fillRect/>
-          </a:stretch>
-        </p:blipFill>
-        <p:spPr bwMode="auto">
-          <a:xfrm>
-            <a:off x="0" y="775080"/>
-            <a:ext cx="3160775" cy="4063854"/>
-          </a:xfrm>
-          <a:prstGeom prst="rect">
-            <a:avLst/>
-          </a:prstGeom>
-          <a:noFill/>
-          <a:ln>
-            <a:noFill/>
-          </a:ln>
-        </p:spPr>
-      </p:pic>
-      <p:pic>
-        <p:nvPicPr>
-          <p:cNvPr id="5" name="Рисунок 4">
-            <a:extLst>
-              <a:ext uri="{FF2B5EF4-FFF2-40B4-BE49-F238E27FC236}">
-                <a16:creationId xmlns:a16="http://schemas.microsoft.com/office/drawing/2014/main" id="{9D3ACC5E-B4A2-4481-A382-D3960E39C11D}"/>
-              </a:ext>
-            </a:extLst>
-          </p:cNvPr>
-          <p:cNvPicPr/>
-          <p:nvPr/>
-        </p:nvPicPr>
-        <p:blipFill>
-          <a:blip r:embed="rId3" cstate="print">
-            <a:extLst>
-              <a:ext uri="{28A0092B-C50C-407E-A947-70E740481C1C}">
-                <a14:useLocalDpi xmlns:a14="http://schemas.microsoft.com/office/drawing/2010/main" val="0"/>
-              </a:ext>
-            </a:extLst>
-          </a:blip>
-          <a:srcRect/>
-          <a:stretch>
-            <a:fillRect/>
-          </a:stretch>
-        </p:blipFill>
-        <p:spPr bwMode="auto">
-          <a:xfrm>
-            <a:off x="2300109" y="864609"/>
-            <a:ext cx="1732804" cy="3978167"/>
-          </a:xfrm>
-          <a:prstGeom prst="rect">
-            <a:avLst/>
-          </a:prstGeom>
-          <a:noFill/>
-          <a:ln>
-            <a:noFill/>
-          </a:ln>
-        </p:spPr>
-      </p:pic>
-      <p:pic>
-        <p:nvPicPr>
-          <p:cNvPr id="6" name="Рисунок 5">
-            <a:extLst>
-              <a:ext uri="{FF2B5EF4-FFF2-40B4-BE49-F238E27FC236}">
-                <a16:creationId xmlns:a16="http://schemas.microsoft.com/office/drawing/2014/main" id="{811C3EAA-631E-4C3A-830E-FD1DBB55D66F}"/>
-              </a:ext>
-            </a:extLst>
-          </p:cNvPr>
-          <p:cNvPicPr/>
-          <p:nvPr/>
-        </p:nvPicPr>
-        <p:blipFill>
-          <a:blip r:embed="rId4">
-            <a:extLst>
-              <a:ext uri="{28A0092B-C50C-407E-A947-70E740481C1C}">
-                <a14:useLocalDpi xmlns:a14="http://schemas.microsoft.com/office/drawing/2010/main" val="0"/>
-              </a:ext>
-            </a:extLst>
-          </a:blip>
-          <a:srcRect/>
-          <a:stretch>
-            <a:fillRect/>
-          </a:stretch>
-        </p:blipFill>
-        <p:spPr bwMode="auto">
-          <a:xfrm>
-            <a:off x="4162315" y="1230050"/>
-            <a:ext cx="4541765" cy="3247283"/>
-          </a:xfrm>
-          <a:prstGeom prst="rect">
-            <a:avLst/>
-          </a:prstGeom>
-          <a:noFill/>
-          <a:ln>
-            <a:noFill/>
-          </a:ln>
-        </p:spPr>
-      </p:pic>
-    </p:spTree>
-    <p:extLst>
-      <p:ext uri="{BB962C8B-B14F-4D97-AF65-F5344CB8AC3E}">
-        <p14:creationId xmlns:p14="http://schemas.microsoft.com/office/powerpoint/2010/main" val="23770044"/>
-      </p:ext>
-    </p:extLst>
-  </p:cSld>
-  <p:clrMapOvr>
-    <a:masterClrMapping/>
-  </p:clrMapOvr>
-</p:sld>
-</file>
-
-<file path=ppt/slides/slide11.xml><?xml version="1.0" encoding="utf-8"?>
-<p:sld xmlns:a="http://schemas.openxmlformats.org/drawingml/2006/main" xmlns:r="http://schemas.openxmlformats.org/officeDocument/2006/relationships" xmlns:p="http://schemas.openxmlformats.org/presentationml/2006/main">
-  <p:cSld>
-    <p:spTree>
-      <p:nvGrpSpPr>
-        <p:cNvPr id="1" name=""/>
-        <p:cNvGrpSpPr/>
-        <p:nvPr/>
-      </p:nvGrpSpPr>
-      <p:grpSpPr>
-        <a:xfrm>
-          <a:off x="0" y="0"/>
-          <a:ext cx="0" cy="0"/>
-          <a:chOff x="0" y="0"/>
-          <a:chExt cx="0" cy="0"/>
-        </a:xfrm>
-      </p:grpSpPr>
-      <p:sp>
-        <p:nvSpPr>
-          <p:cNvPr id="2" name="PlaceHolder 1">
-            <a:extLst>
-              <a:ext uri="{FF2B5EF4-FFF2-40B4-BE49-F238E27FC236}">
                 <a16:creationId xmlns:a16="http://schemas.microsoft.com/office/drawing/2014/main" id="{B9BD79F1-DA52-4A93-BA98-34E86D3EBAC0}"/>
               </a:ext>
             </a:extLst>
@@ -5606,7 +5231,7 @@
             <a:fld id="{A784A474-F8F9-4DC5-8AFE-6638820E2D4C}" type="slidenum">
               <a:rPr lang="ru-RU" smtClean="0"/>
               <a:pPr/>
-              <a:t>11</a:t>
+              <a:t>10</a:t>
             </a:fld>
             <a:endParaRPr lang="ru-RU" dirty="0">
               <a:solidFill>
@@ -5630,7 +5255,7 @@
 </p:sld>
 </file>
 
-<file path=ppt/slides/slide12.xml><?xml version="1.0" encoding="utf-8"?>
+<file path=ppt/slides/slide11.xml><?xml version="1.0" encoding="utf-8"?>
 <p:sld xmlns:a="http://schemas.openxmlformats.org/drawingml/2006/main" xmlns:r="http://schemas.openxmlformats.org/officeDocument/2006/relationships" xmlns:p="http://schemas.openxmlformats.org/presentationml/2006/main">
   <p:cSld>
     <p:spTree>
@@ -5769,7 +5394,7 @@
                 <a:latin typeface="Arial"/>
                 <a:ea typeface="Arial"/>
               </a:rPr>
-              <a:t>12</a:t>
+              <a:t>11</a:t>
             </a:fld>
             <a:endParaRPr lang="en-US" sz="1100" b="0" u="none" strike="noStrike">
               <a:solidFill>
@@ -6152,7 +5777,7 @@
 </p:sld>
 </file>
 
-<file path=ppt/slides/slide13.xml><?xml version="1.0" encoding="utf-8"?>
+<file path=ppt/slides/slide12.xml><?xml version="1.0" encoding="utf-8"?>
 <p:sld xmlns:a="http://schemas.openxmlformats.org/drawingml/2006/main" xmlns:r="http://schemas.openxmlformats.org/officeDocument/2006/relationships" xmlns:p="http://schemas.openxmlformats.org/presentationml/2006/main">
   <p:cSld>
     <p:spTree>
@@ -6297,7 +5922,7 @@
                 <a:latin typeface="Arial"/>
                 <a:ea typeface="Arial"/>
               </a:rPr>
-              <a:t>13</a:t>
+              <a:t>12</a:t>
             </a:fld>
             <a:endParaRPr lang="en-US" sz="1100" b="0" u="none" strike="noStrike">
               <a:solidFill>
@@ -6348,7 +5973,7 @@
 </p:sld>
 </file>
 
-<file path=ppt/slides/slide14.xml><?xml version="1.0" encoding="utf-8"?>
+<file path=ppt/slides/slide13.xml><?xml version="1.0" encoding="utf-8"?>
 <p:sld xmlns:a="http://schemas.openxmlformats.org/drawingml/2006/main" xmlns:r="http://schemas.openxmlformats.org/officeDocument/2006/relationships" xmlns:p="http://schemas.openxmlformats.org/presentationml/2006/main">
   <p:cSld>
     <p:spTree>
@@ -6493,7 +6118,7 @@
                 <a:latin typeface="Arial"/>
                 <a:ea typeface="Arial"/>
               </a:rPr>
-              <a:t>14</a:t>
+              <a:t>13</a:t>
             </a:fld>
             <a:endParaRPr lang="en-US" sz="1100" b="0" u="none" strike="noStrike">
               <a:solidFill>
@@ -6644,7 +6269,7 @@
 </p:sld>
 </file>
 
-<file path=ppt/slides/slide15.xml><?xml version="1.0" encoding="utf-8"?>
+<file path=ppt/slides/slide14.xml><?xml version="1.0" encoding="utf-8"?>
 <p:sld xmlns:a="http://schemas.openxmlformats.org/drawingml/2006/main" xmlns:r="http://schemas.openxmlformats.org/officeDocument/2006/relationships" xmlns:p="http://schemas.openxmlformats.org/presentationml/2006/main">
   <p:cSld>
     <p:spTree>
@@ -6789,7 +6414,7 @@
                 <a:latin typeface="Arial"/>
                 <a:ea typeface="Arial"/>
               </a:rPr>
-              <a:t>15</a:t>
+              <a:t>14</a:t>
             </a:fld>
             <a:endParaRPr lang="en-US" sz="1100" b="0" u="none" strike="noStrike">
               <a:solidFill>
@@ -8894,7 +8519,7 @@
                 <a:latin typeface="Arial"/>
                 <a:ea typeface="Arial"/>
               </a:rPr>
-              <a:t>Язык программирования Rust</a:t>
+              <a:t>Выбор инструментов разработки</a:t>
             </a:r>
             <a:endParaRPr lang="en-US" sz="2400" b="0" u="none" strike="noStrike" dirty="0">
               <a:solidFill>
@@ -8995,7 +8620,7 @@
         </p:nvSpPr>
         <p:spPr>
           <a:xfrm>
-            <a:off x="457200" y="1143000"/>
+            <a:off x="442800" y="775080"/>
             <a:ext cx="8261280" cy="3198960"/>
           </a:xfrm>
           <a:prstGeom prst="rect">
@@ -9033,20 +8658,39 @@
               </a:tabLst>
             </a:pPr>
             <a:r>
-              <a:rPr lang="ru-RU" sz="2000" dirty="0"/>
-              <a:t>Для реализации клиент-серверной многопользовательской игры в данной дипломной работе использовался язык </a:t>
-            </a:r>
-            <a:r>
-              <a:rPr lang="ru-RU" sz="2000" b="1" dirty="0" err="1"/>
+              <a:rPr lang="ru" sz="1600" b="0" u="none" strike="noStrike" dirty="0">
+                <a:solidFill>
+                  <a:srgbClr val="4D4E4F"/>
+                </a:solidFill>
+                <a:effectLst/>
+                <a:uFillTx/>
+                <a:latin typeface="Arial"/>
+                <a:ea typeface="Arial"/>
+              </a:rPr>
+              <a:t>Язык </a:t>
+            </a:r>
+            <a:r>
+              <a:rPr lang="en-US" sz="1600" b="1" dirty="0">
+                <a:solidFill>
+                  <a:srgbClr val="4D4E4F"/>
+                </a:solidFill>
+                <a:latin typeface="Arial"/>
+                <a:ea typeface="Arial"/>
+              </a:rPr>
               <a:t>Rust</a:t>
             </a:r>
-            <a:r>
-              <a:rPr lang="ru-RU" sz="2000" dirty="0"/>
-              <a:t>.</a:t>
-            </a:r>
-          </a:p>
-          <a:p>
-            <a:pPr>
+            <a:endParaRPr lang="ru" sz="1600" b="1" u="none" strike="noStrike" dirty="0">
+              <a:solidFill>
+                <a:srgbClr val="4D4E4F"/>
+              </a:solidFill>
+              <a:effectLst/>
+              <a:uFillTx/>
+              <a:latin typeface="Arial"/>
+              <a:ea typeface="Arial"/>
+            </a:endParaRPr>
+          </a:p>
+          <a:p>
+            <a:pPr lvl="1">
               <a:lnSpc>
                 <a:spcPct val="120000"/>
               </a:lnSpc>
@@ -9054,7 +8698,43 @@
                 <a:tab pos="0" algn="l"/>
               </a:tabLst>
             </a:pPr>
-            <a:endParaRPr lang="en-US" sz="2000" b="0" u="none" strike="noStrike" dirty="0">
+            <a:r>
+              <a:rPr lang="ru" sz="1600" b="0" u="none" strike="noStrike" dirty="0">
+                <a:solidFill>
+                  <a:srgbClr val="4D4E4F"/>
+                </a:solidFill>
+                <a:effectLst/>
+                <a:uFillTx/>
+                <a:latin typeface="Arial"/>
+                <a:ea typeface="Arial"/>
+              </a:rPr>
+              <a:t>Ключевые преимущества </a:t>
+            </a:r>
+            <a:r>
+              <a:rPr lang="en-US" sz="1600" b="0" u="none" strike="noStrike" dirty="0">
+                <a:solidFill>
+                  <a:srgbClr val="4D4E4F"/>
+                </a:solidFill>
+                <a:effectLst/>
+                <a:uFillTx/>
+                <a:latin typeface="Arial"/>
+                <a:ea typeface="Arial"/>
+              </a:rPr>
+              <a:t>Rust</a:t>
+            </a:r>
+            <a:r>
+              <a:rPr lang="ru" sz="1600" b="0" u="none" strike="noStrike" dirty="0">
+                <a:solidFill>
+                  <a:srgbClr val="4D4E4F"/>
+                </a:solidFill>
+                <a:effectLst/>
+                <a:uFillTx/>
+                <a:latin typeface="Arial"/>
+                <a:ea typeface="Arial"/>
+              </a:rPr>
+              <a:t> над C++:</a:t>
+            </a:r>
+            <a:endParaRPr lang="en-US" sz="1600" b="0" u="none" strike="noStrike" dirty="0">
               <a:solidFill>
                 <a:srgbClr val="000000"/>
               </a:solidFill>
@@ -9064,37 +8744,7 @@
             </a:endParaRPr>
           </a:p>
           <a:p>
-            <a:pPr>
-              <a:lnSpc>
-                <a:spcPct val="120000"/>
-              </a:lnSpc>
-              <a:tabLst>
-                <a:tab pos="0" algn="l"/>
-              </a:tabLst>
-            </a:pPr>
-            <a:r>
-              <a:rPr lang="ru" sz="2000" b="0" u="none" strike="noStrike" dirty="0">
-                <a:solidFill>
-                  <a:srgbClr val="4D4E4F"/>
-                </a:solidFill>
-                <a:effectLst/>
-                <a:uFillTx/>
-                <a:latin typeface="Arial"/>
-                <a:ea typeface="Arial"/>
-              </a:rPr>
-              <a:t>Ключевые преимущества над C++:</a:t>
-            </a:r>
-            <a:endParaRPr lang="en-US" sz="2000" b="0" u="none" strike="noStrike" dirty="0">
-              <a:solidFill>
-                <a:srgbClr val="000000"/>
-              </a:solidFill>
-              <a:effectLst/>
-              <a:uFillTx/>
-              <a:latin typeface="Arial"/>
-            </a:endParaRPr>
-          </a:p>
-          <a:p>
-            <a:pPr marL="216000" indent="-216000">
+            <a:pPr marL="673200" lvl="1" indent="-216000">
               <a:lnSpc>
                 <a:spcPct val="120000"/>
               </a:lnSpc>
@@ -9109,7 +8759,7 @@
               </a:tabLst>
             </a:pPr>
             <a:r>
-              <a:rPr lang="ru" sz="2000" b="0" u="none" strike="noStrike" dirty="0">
+              <a:rPr lang="ru" sz="1600" b="0" u="none" strike="noStrike" dirty="0">
                 <a:solidFill>
                   <a:srgbClr val="4D4E4F"/>
                 </a:solidFill>
@@ -9120,7 +8770,7 @@
               </a:rPr>
               <a:t>Безопасность работы с памятью и потоками;</a:t>
             </a:r>
-            <a:endParaRPr lang="en-US" sz="2000" b="0" u="none" strike="noStrike" dirty="0">
+            <a:endParaRPr lang="en-US" sz="1600" b="0" u="none" strike="noStrike" dirty="0">
               <a:solidFill>
                 <a:srgbClr val="000000"/>
               </a:solidFill>
@@ -9130,7 +8780,7 @@
             </a:endParaRPr>
           </a:p>
           <a:p>
-            <a:pPr marL="216000" indent="-216000">
+            <a:pPr marL="673200" lvl="1" indent="-216000">
               <a:lnSpc>
                 <a:spcPct val="120000"/>
               </a:lnSpc>
@@ -9145,7 +8795,7 @@
               </a:tabLst>
             </a:pPr>
             <a:r>
-              <a:rPr lang="ru" sz="2000" b="0" u="none" strike="noStrike" dirty="0">
+              <a:rPr lang="ru" sz="1600" b="0" u="none" strike="noStrike" dirty="0">
                 <a:solidFill>
                   <a:srgbClr val="4D4E4F"/>
                 </a:solidFill>
@@ -9157,7 +8807,7 @@
               <a:t>Инструментарий (</a:t>
             </a:r>
             <a:r>
-              <a:rPr lang="ru-RU" sz="2000" b="0" u="none" strike="noStrike" dirty="0">
+              <a:rPr lang="ru-RU" sz="1600" b="0" u="none" strike="noStrike" dirty="0">
                 <a:solidFill>
                   <a:srgbClr val="4D4E4F"/>
                 </a:solidFill>
@@ -9169,7 +8819,7 @@
               <a:t>система сборки </a:t>
             </a:r>
             <a:r>
-              <a:rPr lang="en-US" sz="2000" b="0" u="none" strike="noStrike" dirty="0">
+              <a:rPr lang="en-US" sz="1600" b="0" u="none" strike="noStrike" dirty="0">
                 <a:solidFill>
                   <a:srgbClr val="4D4E4F"/>
                 </a:solidFill>
@@ -9181,7 +8831,7 @@
               <a:t>cargo, crates.io</a:t>
             </a:r>
             <a:r>
-              <a:rPr lang="ru" sz="2000" b="0" u="none" strike="noStrike" dirty="0">
+              <a:rPr lang="ru" sz="1600" b="0" u="none" strike="noStrike" dirty="0">
                 <a:solidFill>
                   <a:srgbClr val="4D4E4F"/>
                 </a:solidFill>
@@ -9192,7 +8842,7 @@
               </a:rPr>
               <a:t>);</a:t>
             </a:r>
-            <a:endParaRPr lang="en-US" sz="2000" b="0" u="none" strike="noStrike" dirty="0">
+            <a:endParaRPr lang="en-US" sz="1600" b="0" u="none" strike="noStrike" dirty="0">
               <a:solidFill>
                 <a:srgbClr val="000000"/>
               </a:solidFill>
@@ -9210,7 +8860,130 @@
                 <a:tab pos="0" algn="l"/>
               </a:tabLst>
             </a:pPr>
-            <a:endParaRPr lang="en-US" sz="2000" b="0" u="none" strike="noStrike" dirty="0">
+            <a:endParaRPr lang="en-US" sz="1600" b="0" u="none" strike="noStrike" dirty="0">
+              <a:solidFill>
+                <a:srgbClr val="000000"/>
+              </a:solidFill>
+              <a:effectLst/>
+              <a:uFillTx/>
+              <a:latin typeface="Arial"/>
+            </a:endParaRPr>
+          </a:p>
+          <a:p>
+            <a:r>
+              <a:rPr lang="ru-RU" sz="1600" dirty="0"/>
+              <a:t>Движок </a:t>
+            </a:r>
+            <a:r>
+              <a:rPr lang="ru-RU" sz="1600" b="1" dirty="0" err="1"/>
+              <a:t>Bevy</a:t>
+            </a:r>
+            <a:endParaRPr lang="ru-RU" sz="1600" dirty="0"/>
+          </a:p>
+          <a:p>
+            <a:pPr lvl="1"/>
+            <a:r>
+              <a:rPr lang="ru-RU" sz="1600" dirty="0"/>
+              <a:t>Преимущества </a:t>
+            </a:r>
+            <a:r>
+              <a:rPr lang="ru-RU" sz="1600" dirty="0" err="1"/>
+              <a:t>Bevy</a:t>
+            </a:r>
+            <a:r>
+              <a:rPr lang="ru-RU" sz="1600" b="1" dirty="0"/>
+              <a:t>:</a:t>
+            </a:r>
+            <a:endParaRPr lang="ru-RU" sz="1600" dirty="0"/>
+          </a:p>
+          <a:p>
+            <a:pPr marL="800100" lvl="1" indent="-342900">
+              <a:buFont typeface="Arial" panose="020B0604020202020204" pitchFamily="34" charset="0"/>
+              <a:buChar char="•"/>
+            </a:pPr>
+            <a:r>
+              <a:rPr lang="ru-RU" sz="1600" dirty="0"/>
+              <a:t>Архитектура ECS (</a:t>
+            </a:r>
+            <a:r>
+              <a:rPr lang="ru-RU" sz="1600" dirty="0" err="1"/>
+              <a:t>Entity</a:t>
+            </a:r>
+            <a:r>
+              <a:rPr lang="ru-RU" sz="1600" dirty="0"/>
+              <a:t>-</a:t>
+            </a:r>
+            <a:r>
+              <a:rPr lang="ru-RU" sz="1600" dirty="0" err="1"/>
+              <a:t>Component</a:t>
+            </a:r>
+            <a:r>
+              <a:rPr lang="ru-RU" sz="1600" dirty="0"/>
+              <a:t>-System), обеспечивающая модульность и масштабируемость.</a:t>
+            </a:r>
+          </a:p>
+          <a:p>
+            <a:pPr marL="800100" lvl="1" indent="-342900">
+              <a:buFont typeface="Arial" panose="020B0604020202020204" pitchFamily="34" charset="0"/>
+              <a:buChar char="•"/>
+            </a:pPr>
+            <a:r>
+              <a:rPr lang="ru-RU" sz="1600" dirty="0"/>
+              <a:t>Удобная система плагинов.</a:t>
+            </a:r>
+            <a:endParaRPr lang="en-US" sz="1600" dirty="0"/>
+          </a:p>
+          <a:p>
+            <a:endParaRPr lang="ru-RU" sz="1600" dirty="0"/>
+          </a:p>
+          <a:p>
+            <a:r>
+              <a:rPr lang="ru-RU" sz="1600" b="1" dirty="0" err="1"/>
+              <a:t>bevy_quinnet</a:t>
+            </a:r>
+            <a:r>
+              <a:rPr lang="ru-RU" sz="1600" dirty="0"/>
+              <a:t> — библиотека на базе QUIC.</a:t>
+            </a:r>
+          </a:p>
+          <a:p>
+            <a:endParaRPr lang="en-US" sz="1600" b="0" u="none" strike="noStrike" dirty="0">
+              <a:solidFill>
+                <a:srgbClr val="000000"/>
+              </a:solidFill>
+              <a:effectLst/>
+              <a:uFillTx/>
+              <a:latin typeface="Arial"/>
+            </a:endParaRPr>
+          </a:p>
+          <a:p>
+            <a:pPr>
+              <a:lnSpc>
+                <a:spcPct val="120000"/>
+              </a:lnSpc>
+              <a:tabLst>
+                <a:tab pos="0" algn="l"/>
+              </a:tabLst>
+            </a:pPr>
+            <a:endParaRPr lang="en-US" sz="1600" b="0" u="none" strike="noStrike" dirty="0">
+              <a:solidFill>
+                <a:srgbClr val="000000"/>
+              </a:solidFill>
+              <a:effectLst/>
+              <a:uFillTx/>
+              <a:latin typeface="Arial"/>
+            </a:endParaRPr>
+          </a:p>
+          <a:p>
+            <a:pPr>
+              <a:lnSpc>
+                <a:spcPct val="120000"/>
+              </a:lnSpc>
+              <a:tabLst>
+                <a:tab pos="0" algn="l"/>
+              </a:tabLst>
+            </a:pPr>
+            <a:endParaRPr lang="en-US" sz="1600" b="0" u="none" strike="noStrike" dirty="0">
               <a:solidFill>
                 <a:srgbClr val="000000"/>
               </a:solidFill>
@@ -9243,310 +9016,20 @@
         </p:blipFill>
         <p:spPr>
           <a:xfrm>
-            <a:off x="3133290" y="3348915"/>
-            <a:ext cx="3562350" cy="1609725"/>
+            <a:off x="6006791" y="996886"/>
+            <a:ext cx="2746770" cy="1241188"/>
           </a:xfrm>
           <a:prstGeom prst="rect">
             <a:avLst/>
           </a:prstGeom>
         </p:spPr>
       </p:pic>
-    </p:spTree>
-  </p:cSld>
-  <p:clrMapOvr>
-    <a:masterClrMapping/>
-  </p:clrMapOvr>
-</p:sld>
-</file>
-
-<file path=ppt/slides/slide8.xml><?xml version="1.0" encoding="utf-8"?>
-<p:sld xmlns:a="http://schemas.openxmlformats.org/drawingml/2006/main" xmlns:r="http://schemas.openxmlformats.org/officeDocument/2006/relationships" xmlns:p="http://schemas.openxmlformats.org/presentationml/2006/main">
-  <p:cSld>
-    <p:spTree>
-      <p:nvGrpSpPr>
-        <p:cNvPr id="1" name=""/>
-        <p:cNvGrpSpPr/>
-        <p:nvPr/>
-      </p:nvGrpSpPr>
-      <p:grpSpPr>
-        <a:xfrm>
-          <a:off x="0" y="0"/>
-          <a:ext cx="0" cy="0"/>
-          <a:chOff x="0" y="0"/>
-          <a:chExt cx="0" cy="0"/>
-        </a:xfrm>
-      </p:grpSpPr>
-      <p:sp>
-        <p:nvSpPr>
-          <p:cNvPr id="2" name="PlaceHolder 1">
+      <p:pic>
+        <p:nvPicPr>
+          <p:cNvPr id="6" name="Picture 2" descr="Picture background">
             <a:extLst>
               <a:ext uri="{FF2B5EF4-FFF2-40B4-BE49-F238E27FC236}">
-                <a16:creationId xmlns:a16="http://schemas.microsoft.com/office/drawing/2014/main" id="{93445227-D671-4684-BFF4-6B42610137C4}"/>
-              </a:ext>
-            </a:extLst>
-          </p:cNvPr>
-          <p:cNvSpPr txBox="1">
-            <a:spLocks/>
-          </p:cNvSpPr>
-          <p:nvPr/>
-        </p:nvSpPr>
-        <p:spPr>
-          <a:xfrm>
-            <a:off x="442800" y="337680"/>
-            <a:ext cx="6252840" cy="437400"/>
-          </a:xfrm>
-          <a:prstGeom prst="rect">
-            <a:avLst/>
-          </a:prstGeom>
-          <a:noFill/>
-          <a:ln w="0">
-            <a:noFill/>
-          </a:ln>
-        </p:spPr>
-        <p:txBody>
-          <a:bodyPr lIns="19080" tIns="19080" rIns="19080" bIns="19080" anchor="t">
-            <a:noAutofit/>
-          </a:bodyPr>
-          <a:lstStyle>
-            <a:lvl1pPr algn="l" defTabSz="914400" rtl="0" eaLnBrk="1" latinLnBrk="0" hangingPunct="1">
-              <a:lnSpc>
-                <a:spcPct val="90000"/>
-              </a:lnSpc>
-              <a:spcBef>
-                <a:spcPct val="0"/>
-              </a:spcBef>
-              <a:buNone/>
-              <a:defRPr sz="4400" kern="1200">
-                <a:solidFill>
-                  <a:schemeClr val="tx1"/>
-                </a:solidFill>
-                <a:latin typeface="+mj-lt"/>
-                <a:ea typeface="+mj-ea"/>
-                <a:cs typeface="+mj-cs"/>
-              </a:defRPr>
-            </a:lvl1pPr>
-          </a:lstStyle>
-          <a:p>
-            <a:pPr>
-              <a:lnSpc>
-                <a:spcPct val="80000"/>
-              </a:lnSpc>
-              <a:tabLst>
-                <a:tab pos="0" algn="l"/>
-              </a:tabLst>
-            </a:pPr>
-            <a:r>
-              <a:rPr lang="ru-RU" sz="2400" b="1" dirty="0">
-                <a:solidFill>
-                  <a:srgbClr val="FF9400"/>
-                </a:solidFill>
-                <a:latin typeface="Arial"/>
-                <a:ea typeface="Arial"/>
-              </a:rPr>
-              <a:t>Библиотека </a:t>
-            </a:r>
-            <a:r>
-              <a:rPr lang="en-US" sz="2400" b="1" dirty="0">
-                <a:solidFill>
-                  <a:srgbClr val="FF9400"/>
-                </a:solidFill>
-                <a:latin typeface="Arial"/>
-                <a:ea typeface="Arial"/>
-              </a:rPr>
-              <a:t>Bevy</a:t>
-            </a:r>
-            <a:r>
-              <a:rPr lang="en-US" sz="2400" b="1" dirty="0">
-                <a:solidFill>
-                  <a:srgbClr val="FF9400"/>
-                </a:solidFill>
-                <a:ea typeface="Arial"/>
-              </a:rPr>
-              <a:t>, </a:t>
-            </a:r>
-            <a:r>
-              <a:rPr lang="en-US" sz="2400" b="1" dirty="0" err="1">
-                <a:solidFill>
-                  <a:srgbClr val="FF9400"/>
-                </a:solidFill>
-                <a:ea typeface="Arial"/>
-              </a:rPr>
-              <a:t>bevy_quinnet</a:t>
-            </a:r>
-            <a:endParaRPr lang="en-US" sz="2400" dirty="0">
-              <a:solidFill>
-                <a:srgbClr val="000000"/>
-              </a:solidFill>
-              <a:latin typeface="Arial"/>
-            </a:endParaRPr>
-          </a:p>
-        </p:txBody>
-      </p:sp>
-      <p:sp>
-        <p:nvSpPr>
-          <p:cNvPr id="3" name="PlaceHolder 11">
-            <a:extLst>
-              <a:ext uri="{FF2B5EF4-FFF2-40B4-BE49-F238E27FC236}">
-                <a16:creationId xmlns:a16="http://schemas.microsoft.com/office/drawing/2014/main" id="{312EA1D8-6B1C-4476-A7CE-DD7A4E828813}"/>
-              </a:ext>
-            </a:extLst>
-          </p:cNvPr>
-          <p:cNvSpPr/>
-          <p:nvPr/>
-        </p:nvSpPr>
-        <p:spPr>
-          <a:xfrm>
-            <a:off x="442800" y="972270"/>
-            <a:ext cx="8261280" cy="3198960"/>
-          </a:xfrm>
-          <a:prstGeom prst="rect">
-            <a:avLst/>
-          </a:prstGeom>
-          <a:noFill/>
-          <a:ln w="0">
-            <a:noFill/>
-          </a:ln>
-        </p:spPr>
-        <p:style>
-          <a:lnRef idx="0">
-            <a:scrgbClr r="0" g="0" b="0"/>
-          </a:lnRef>
-          <a:fillRef idx="0">
-            <a:scrgbClr r="0" g="0" b="0"/>
-          </a:fillRef>
-          <a:effectRef idx="0">
-            <a:scrgbClr r="0" g="0" b="0"/>
-          </a:effectRef>
-          <a:fontRef idx="minor"/>
-        </p:style>
-        <p:txBody>
-          <a:bodyPr lIns="19080" tIns="19080" rIns="19080" bIns="19080" anchor="t">
-            <a:noAutofit/>
-          </a:bodyPr>
-          <a:lstStyle/>
-          <a:p>
-            <a:r>
-              <a:rPr lang="ru-RU" sz="2000" dirty="0"/>
-              <a:t>Для построения игровой логики применён движок </a:t>
-            </a:r>
-            <a:r>
-              <a:rPr lang="ru-RU" sz="2000" b="1" dirty="0" err="1"/>
-              <a:t>Bevy</a:t>
-            </a:r>
-            <a:r>
-              <a:rPr lang="ru-RU" sz="2000" dirty="0"/>
-              <a:t>.</a:t>
-            </a:r>
-            <a:endParaRPr lang="en-US" sz="2000" dirty="0"/>
-          </a:p>
-          <a:p>
-            <a:endParaRPr lang="ru-RU" sz="2000" dirty="0"/>
-          </a:p>
-          <a:p>
-            <a:r>
-              <a:rPr lang="ru-RU" sz="2000" dirty="0"/>
-              <a:t>Преимущества </a:t>
-            </a:r>
-            <a:r>
-              <a:rPr lang="ru-RU" sz="2000" dirty="0" err="1"/>
-              <a:t>Bevy</a:t>
-            </a:r>
-            <a:r>
-              <a:rPr lang="ru-RU" sz="2000" b="1" dirty="0"/>
-              <a:t>:</a:t>
-            </a:r>
-            <a:endParaRPr lang="ru-RU" sz="2000" dirty="0"/>
-          </a:p>
-          <a:p>
-            <a:pPr marL="342900" indent="-342900">
-              <a:buFont typeface="Arial" panose="020B0604020202020204" pitchFamily="34" charset="0"/>
-              <a:buChar char="•"/>
-            </a:pPr>
-            <a:r>
-              <a:rPr lang="ru-RU" sz="2000" dirty="0"/>
-              <a:t>Архитектура ECS (</a:t>
-            </a:r>
-            <a:r>
-              <a:rPr lang="ru-RU" sz="2000" dirty="0" err="1"/>
-              <a:t>Entity-Component-System</a:t>
-            </a:r>
-            <a:r>
-              <a:rPr lang="ru-RU" sz="2000" dirty="0"/>
-              <a:t>), обеспечивающая модульность и масштабируемость.</a:t>
-            </a:r>
-          </a:p>
-          <a:p>
-            <a:pPr marL="342900" indent="-342900">
-              <a:buFont typeface="Arial" panose="020B0604020202020204" pitchFamily="34" charset="0"/>
-              <a:buChar char="•"/>
-            </a:pPr>
-            <a:r>
-              <a:rPr lang="ru-RU" sz="2000" dirty="0"/>
-              <a:t>Удобная система плагинов.</a:t>
-            </a:r>
-            <a:endParaRPr lang="en-US" sz="2000" dirty="0"/>
-          </a:p>
-          <a:p>
-            <a:endParaRPr lang="ru-RU" sz="2000" dirty="0"/>
-          </a:p>
-          <a:p>
-            <a:r>
-              <a:rPr lang="ru-RU" sz="2000" dirty="0"/>
-              <a:t>Для сетевого взаимодействия выбран </a:t>
-            </a:r>
-            <a:r>
-              <a:rPr lang="ru-RU" sz="2000" dirty="0" err="1"/>
-              <a:t>bevy_quinnet</a:t>
-            </a:r>
-            <a:r>
-              <a:rPr lang="ru-RU" sz="2000" dirty="0"/>
-              <a:t> — библиотека на базе QUIC.</a:t>
-            </a:r>
-          </a:p>
-          <a:p>
-            <a:pPr>
-              <a:lnSpc>
-                <a:spcPct val="120000"/>
-              </a:lnSpc>
-              <a:tabLst>
-                <a:tab pos="0" algn="l"/>
-              </a:tabLst>
-            </a:pPr>
-            <a:endParaRPr lang="en-US" sz="2000" b="0" u="none" strike="noStrike" dirty="0">
-              <a:solidFill>
-                <a:srgbClr val="000000"/>
-              </a:solidFill>
-              <a:effectLst/>
-              <a:uFillTx/>
-              <a:latin typeface="Arial"/>
-            </a:endParaRPr>
-          </a:p>
-          <a:p>
-            <a:pPr>
-              <a:lnSpc>
-                <a:spcPct val="120000"/>
-              </a:lnSpc>
-              <a:tabLst>
-                <a:tab pos="0" algn="l"/>
-              </a:tabLst>
-            </a:pPr>
-            <a:endParaRPr lang="en-US" sz="2000" b="0" u="none" strike="noStrike" dirty="0">
-              <a:solidFill>
-                <a:srgbClr val="000000"/>
-              </a:solidFill>
-              <a:effectLst/>
-              <a:uFillTx/>
-              <a:latin typeface="Arial"/>
-            </a:endParaRPr>
-          </a:p>
-        </p:txBody>
-      </p:sp>
-      <p:pic>
-        <p:nvPicPr>
-          <p:cNvPr id="5122" name="Picture 2" descr="Picture background">
-            <a:extLst>
-              <a:ext uri="{FF2B5EF4-FFF2-40B4-BE49-F238E27FC236}">
-                <a16:creationId xmlns:a16="http://schemas.microsoft.com/office/drawing/2014/main" id="{4B0F22A2-3033-4F4A-BF60-B8BBB947DFDA}"/>
+                <a16:creationId xmlns:a16="http://schemas.microsoft.com/office/drawing/2014/main" id="{6DEE3C73-64A9-43D2-8913-61AD5AF41C68}"/>
               </a:ext>
             </a:extLst>
           </p:cNvPr>
@@ -9556,7 +9039,7 @@
           <p:nvPr/>
         </p:nvPicPr>
         <p:blipFill>
-          <a:blip r:embed="rId2" cstate="print">
+          <a:blip r:embed="rId3" cstate="print">
             <a:extLst>
               <a:ext uri="{28A0092B-C50C-407E-A947-70E740481C1C}">
                 <a14:useLocalDpi xmlns:a14="http://schemas.microsoft.com/office/drawing/2010/main" val="0"/>
@@ -9570,7 +9053,7 @@
         </p:blipFill>
         <p:spPr bwMode="auto">
           <a:xfrm>
-            <a:off x="3353936" y="3669476"/>
+            <a:off x="5374635" y="3193376"/>
             <a:ext cx="2436127" cy="1218064"/>
           </a:xfrm>
           <a:prstGeom prst="rect">
@@ -9588,162 +9071,7 @@
           </a:extLst>
         </p:spPr>
       </p:pic>
-      <p:sp>
-        <p:nvSpPr>
-          <p:cNvPr id="5" name="PlaceHolder 2">
-            <a:extLst>
-              <a:ext uri="{FF2B5EF4-FFF2-40B4-BE49-F238E27FC236}">
-                <a16:creationId xmlns:a16="http://schemas.microsoft.com/office/drawing/2014/main" id="{C0E1D727-61EF-4924-92E9-1F193CFD0EF1}"/>
-              </a:ext>
-            </a:extLst>
-          </p:cNvPr>
-          <p:cNvSpPr txBox="1">
-            <a:spLocks/>
-          </p:cNvSpPr>
-          <p:nvPr/>
-        </p:nvSpPr>
-        <p:spPr>
-          <a:xfrm>
-            <a:off x="8704080" y="4816440"/>
-            <a:ext cx="203040" cy="142200"/>
-          </a:xfrm>
-          <a:prstGeom prst="rect">
-            <a:avLst/>
-          </a:prstGeom>
-          <a:noFill/>
-          <a:ln w="0">
-            <a:noFill/>
-          </a:ln>
-        </p:spPr>
-        <p:txBody>
-          <a:bodyPr lIns="19080" tIns="19080" rIns="19080" bIns="19080" anchor="t">
-            <a:noAutofit/>
-          </a:bodyPr>
-          <a:lstStyle>
-            <a:defPPr>
-              <a:defRPr lang="ru-RU"/>
-            </a:defPPr>
-            <a:lvl1pPr marL="0" indent="0" algn="r" defTabSz="914400" rtl="0" eaLnBrk="1" latinLnBrk="0" hangingPunct="1">
-              <a:lnSpc>
-                <a:spcPct val="100000"/>
-              </a:lnSpc>
-              <a:buNone/>
-              <a:tabLst>
-                <a:tab pos="0" algn="l"/>
-              </a:tabLst>
-              <a:defRPr lang="ru" sz="1100" b="0" u="none" strike="noStrike" kern="1200">
-                <a:solidFill>
-                  <a:srgbClr val="4D4E4F"/>
-                </a:solidFill>
-                <a:effectLst/>
-                <a:uFillTx/>
-                <a:latin typeface="Arial"/>
-                <a:ea typeface="Arial"/>
-                <a:cs typeface="+mn-cs"/>
-              </a:defRPr>
-            </a:lvl1pPr>
-            <a:lvl2pPr marL="457200" algn="l" defTabSz="914400" rtl="0" eaLnBrk="1" latinLnBrk="0" hangingPunct="1">
-              <a:defRPr sz="1800" kern="1200">
-                <a:solidFill>
-                  <a:schemeClr val="tx1"/>
-                </a:solidFill>
-                <a:latin typeface="+mn-lt"/>
-                <a:ea typeface="+mn-ea"/>
-                <a:cs typeface="+mn-cs"/>
-              </a:defRPr>
-            </a:lvl2pPr>
-            <a:lvl3pPr marL="914400" algn="l" defTabSz="914400" rtl="0" eaLnBrk="1" latinLnBrk="0" hangingPunct="1">
-              <a:defRPr sz="1800" kern="1200">
-                <a:solidFill>
-                  <a:schemeClr val="tx1"/>
-                </a:solidFill>
-                <a:latin typeface="+mn-lt"/>
-                <a:ea typeface="+mn-ea"/>
-                <a:cs typeface="+mn-cs"/>
-              </a:defRPr>
-            </a:lvl3pPr>
-            <a:lvl4pPr marL="1371600" algn="l" defTabSz="914400" rtl="0" eaLnBrk="1" latinLnBrk="0" hangingPunct="1">
-              <a:defRPr sz="1800" kern="1200">
-                <a:solidFill>
-                  <a:schemeClr val="tx1"/>
-                </a:solidFill>
-                <a:latin typeface="+mn-lt"/>
-                <a:ea typeface="+mn-ea"/>
-                <a:cs typeface="+mn-cs"/>
-              </a:defRPr>
-            </a:lvl4pPr>
-            <a:lvl5pPr marL="1828800" algn="l" defTabSz="914400" rtl="0" eaLnBrk="1" latinLnBrk="0" hangingPunct="1">
-              <a:defRPr sz="1800" kern="1200">
-                <a:solidFill>
-                  <a:schemeClr val="tx1"/>
-                </a:solidFill>
-                <a:latin typeface="+mn-lt"/>
-                <a:ea typeface="+mn-ea"/>
-                <a:cs typeface="+mn-cs"/>
-              </a:defRPr>
-            </a:lvl5pPr>
-            <a:lvl6pPr marL="2286000" algn="l" defTabSz="914400" rtl="0" eaLnBrk="1" latinLnBrk="0" hangingPunct="1">
-              <a:defRPr sz="1800" kern="1200">
-                <a:solidFill>
-                  <a:schemeClr val="tx1"/>
-                </a:solidFill>
-                <a:latin typeface="+mn-lt"/>
-                <a:ea typeface="+mn-ea"/>
-                <a:cs typeface="+mn-cs"/>
-              </a:defRPr>
-            </a:lvl6pPr>
-            <a:lvl7pPr marL="2743200" algn="l" defTabSz="914400" rtl="0" eaLnBrk="1" latinLnBrk="0" hangingPunct="1">
-              <a:defRPr sz="1800" kern="1200">
-                <a:solidFill>
-                  <a:schemeClr val="tx1"/>
-                </a:solidFill>
-                <a:latin typeface="+mn-lt"/>
-                <a:ea typeface="+mn-ea"/>
-                <a:cs typeface="+mn-cs"/>
-              </a:defRPr>
-            </a:lvl7pPr>
-            <a:lvl8pPr marL="3200400" algn="l" defTabSz="914400" rtl="0" eaLnBrk="1" latinLnBrk="0" hangingPunct="1">
-              <a:defRPr sz="1800" kern="1200">
-                <a:solidFill>
-                  <a:schemeClr val="tx1"/>
-                </a:solidFill>
-                <a:latin typeface="+mn-lt"/>
-                <a:ea typeface="+mn-ea"/>
-                <a:cs typeface="+mn-cs"/>
-              </a:defRPr>
-            </a:lvl8pPr>
-            <a:lvl9pPr marL="3657600" algn="l" defTabSz="914400" rtl="0" eaLnBrk="1" latinLnBrk="0" hangingPunct="1">
-              <a:defRPr sz="1800" kern="1200">
-                <a:solidFill>
-                  <a:schemeClr val="tx1"/>
-                </a:solidFill>
-                <a:latin typeface="+mn-lt"/>
-                <a:ea typeface="+mn-ea"/>
-                <a:cs typeface="+mn-cs"/>
-              </a:defRPr>
-            </a:lvl9pPr>
-          </a:lstStyle>
-          <a:p>
-            <a:fld id="{76994A23-3ABE-4C2C-AD97-0B67B0B8959B}" type="slidenum">
-              <a:rPr lang="ru-RU" smtClean="0"/>
-              <a:pPr/>
-              <a:t>8</a:t>
-            </a:fld>
-            <a:endParaRPr lang="ru-RU" dirty="0">
-              <a:solidFill>
-                <a:srgbClr val="000000"/>
-              </a:solidFill>
-              <a:latin typeface="Times New Roman"/>
-            </a:endParaRPr>
-          </a:p>
-        </p:txBody>
-      </p:sp>
     </p:spTree>
-    <p:extLst>
-      <p:ext uri="{BB962C8B-B14F-4D97-AF65-F5344CB8AC3E}">
-        <p14:creationId xmlns:p14="http://schemas.microsoft.com/office/powerpoint/2010/main" val="1226420949"/>
-      </p:ext>
-    </p:extLst>
   </p:cSld>
   <p:clrMapOvr>
     <a:masterClrMapping/>
@@ -9751,7 +9079,7 @@
 </p:sld>
 </file>
 
-<file path=ppt/slides/slide9.xml><?xml version="1.0" encoding="utf-8"?>
+<file path=ppt/slides/slide8.xml><?xml version="1.0" encoding="utf-8"?>
 <p:sld xmlns:a="http://schemas.openxmlformats.org/drawingml/2006/main" xmlns:r="http://schemas.openxmlformats.org/officeDocument/2006/relationships" xmlns:p="http://schemas.openxmlformats.org/presentationml/2006/main">
   <p:cSld>
     <p:spTree>
@@ -9908,7 +9236,7 @@
                 <a:latin typeface="Arial"/>
                 <a:ea typeface="Arial"/>
               </a:rPr>
-              <a:t>9</a:t>
+              <a:t>8</a:t>
             </a:fld>
             <a:endParaRPr lang="en-US" sz="1100" b="0" u="none" strike="noStrike">
               <a:solidFill>
@@ -9961,6 +9289,380 @@
         </p:spPr>
       </p:pic>
     </p:spTree>
+  </p:cSld>
+  <p:clrMapOvr>
+    <a:masterClrMapping/>
+  </p:clrMapOvr>
+</p:sld>
+</file>
+
+<file path=ppt/slides/slide9.xml><?xml version="1.0" encoding="utf-8"?>
+<p:sld xmlns:a="http://schemas.openxmlformats.org/drawingml/2006/main" xmlns:r="http://schemas.openxmlformats.org/officeDocument/2006/relationships" xmlns:p="http://schemas.openxmlformats.org/presentationml/2006/main">
+  <p:cSld>
+    <p:spTree>
+      <p:nvGrpSpPr>
+        <p:cNvPr id="1" name=""/>
+        <p:cNvGrpSpPr/>
+        <p:nvPr/>
+      </p:nvGrpSpPr>
+      <p:grpSpPr>
+        <a:xfrm>
+          <a:off x="0" y="0"/>
+          <a:ext cx="0" cy="0"/>
+          <a:chOff x="0" y="0"/>
+          <a:chExt cx="0" cy="0"/>
+        </a:xfrm>
+      </p:grpSpPr>
+      <p:sp>
+        <p:nvSpPr>
+          <p:cNvPr id="2" name="PlaceHolder 1">
+            <a:extLst>
+              <a:ext uri="{FF2B5EF4-FFF2-40B4-BE49-F238E27FC236}">
+                <a16:creationId xmlns:a16="http://schemas.microsoft.com/office/drawing/2014/main" id="{DCF9F8F2-C936-4715-BA43-D9419DF9C869}"/>
+              </a:ext>
+            </a:extLst>
+          </p:cNvPr>
+          <p:cNvSpPr txBox="1">
+            <a:spLocks/>
+          </p:cNvSpPr>
+          <p:nvPr/>
+        </p:nvSpPr>
+        <p:spPr>
+          <a:xfrm>
+            <a:off x="442800" y="337680"/>
+            <a:ext cx="6252840" cy="437400"/>
+          </a:xfrm>
+          <a:prstGeom prst="rect">
+            <a:avLst/>
+          </a:prstGeom>
+          <a:noFill/>
+          <a:ln w="0">
+            <a:noFill/>
+          </a:ln>
+        </p:spPr>
+        <p:txBody>
+          <a:bodyPr lIns="19080" tIns="19080" rIns="19080" bIns="19080" anchor="t">
+            <a:noAutofit/>
+          </a:bodyPr>
+          <a:lstStyle>
+            <a:lvl1pPr algn="l" defTabSz="914400" rtl="0" eaLnBrk="1" latinLnBrk="0" hangingPunct="1">
+              <a:lnSpc>
+                <a:spcPct val="90000"/>
+              </a:lnSpc>
+              <a:spcBef>
+                <a:spcPct val="0"/>
+              </a:spcBef>
+              <a:buNone/>
+              <a:defRPr sz="4400" kern="1200">
+                <a:solidFill>
+                  <a:schemeClr val="tx1"/>
+                </a:solidFill>
+                <a:latin typeface="+mj-lt"/>
+                <a:ea typeface="+mj-ea"/>
+                <a:cs typeface="+mj-cs"/>
+              </a:defRPr>
+            </a:lvl1pPr>
+          </a:lstStyle>
+          <a:p>
+            <a:pPr>
+              <a:lnSpc>
+                <a:spcPct val="80000"/>
+              </a:lnSpc>
+              <a:tabLst>
+                <a:tab pos="0" algn="l"/>
+              </a:tabLst>
+            </a:pPr>
+            <a:r>
+              <a:rPr lang="ru-RU" sz="2400" b="1" dirty="0">
+                <a:solidFill>
+                  <a:srgbClr val="FF9400"/>
+                </a:solidFill>
+                <a:latin typeface="Arial"/>
+              </a:rPr>
+              <a:t>Архитектура клиента</a:t>
+            </a:r>
+            <a:endParaRPr lang="en-US" sz="2400" dirty="0">
+              <a:solidFill>
+                <a:srgbClr val="000000"/>
+              </a:solidFill>
+              <a:latin typeface="Arial"/>
+            </a:endParaRPr>
+          </a:p>
+        </p:txBody>
+      </p:sp>
+      <p:sp>
+        <p:nvSpPr>
+          <p:cNvPr id="3" name="PlaceHolder 2">
+            <a:extLst>
+              <a:ext uri="{FF2B5EF4-FFF2-40B4-BE49-F238E27FC236}">
+                <a16:creationId xmlns:a16="http://schemas.microsoft.com/office/drawing/2014/main" id="{BA95EA29-E22E-4B6C-AF0F-429C0485ACB8}"/>
+              </a:ext>
+            </a:extLst>
+          </p:cNvPr>
+          <p:cNvSpPr txBox="1">
+            <a:spLocks/>
+          </p:cNvSpPr>
+          <p:nvPr/>
+        </p:nvSpPr>
+        <p:spPr>
+          <a:xfrm>
+            <a:off x="8704080" y="4816440"/>
+            <a:ext cx="203040" cy="142200"/>
+          </a:xfrm>
+          <a:prstGeom prst="rect">
+            <a:avLst/>
+          </a:prstGeom>
+          <a:noFill/>
+          <a:ln w="0">
+            <a:noFill/>
+          </a:ln>
+        </p:spPr>
+        <p:txBody>
+          <a:bodyPr lIns="19080" tIns="19080" rIns="19080" bIns="19080" anchor="t">
+            <a:noAutofit/>
+          </a:bodyPr>
+          <a:lstStyle>
+            <a:defPPr>
+              <a:defRPr lang="ru-RU"/>
+            </a:defPPr>
+            <a:lvl1pPr marL="0" indent="0" algn="r" defTabSz="914400" rtl="0" eaLnBrk="1" latinLnBrk="0" hangingPunct="1">
+              <a:lnSpc>
+                <a:spcPct val="100000"/>
+              </a:lnSpc>
+              <a:buNone/>
+              <a:tabLst>
+                <a:tab pos="0" algn="l"/>
+              </a:tabLst>
+              <a:defRPr lang="ru" sz="1100" b="0" u="none" strike="noStrike" kern="1200">
+                <a:solidFill>
+                  <a:srgbClr val="4D4E4F"/>
+                </a:solidFill>
+                <a:effectLst/>
+                <a:uFillTx/>
+                <a:latin typeface="Arial"/>
+                <a:ea typeface="Arial"/>
+                <a:cs typeface="+mn-cs"/>
+              </a:defRPr>
+            </a:lvl1pPr>
+            <a:lvl2pPr marL="457200" algn="l" defTabSz="914400" rtl="0" eaLnBrk="1" latinLnBrk="0" hangingPunct="1">
+              <a:defRPr sz="1800" kern="1200">
+                <a:solidFill>
+                  <a:schemeClr val="tx1"/>
+                </a:solidFill>
+                <a:latin typeface="+mn-lt"/>
+                <a:ea typeface="+mn-ea"/>
+                <a:cs typeface="+mn-cs"/>
+              </a:defRPr>
+            </a:lvl2pPr>
+            <a:lvl3pPr marL="914400" algn="l" defTabSz="914400" rtl="0" eaLnBrk="1" latinLnBrk="0" hangingPunct="1">
+              <a:defRPr sz="1800" kern="1200">
+                <a:solidFill>
+                  <a:schemeClr val="tx1"/>
+                </a:solidFill>
+                <a:latin typeface="+mn-lt"/>
+                <a:ea typeface="+mn-ea"/>
+                <a:cs typeface="+mn-cs"/>
+              </a:defRPr>
+            </a:lvl3pPr>
+            <a:lvl4pPr marL="1371600" algn="l" defTabSz="914400" rtl="0" eaLnBrk="1" latinLnBrk="0" hangingPunct="1">
+              <a:defRPr sz="1800" kern="1200">
+                <a:solidFill>
+                  <a:schemeClr val="tx1"/>
+                </a:solidFill>
+                <a:latin typeface="+mn-lt"/>
+                <a:ea typeface="+mn-ea"/>
+                <a:cs typeface="+mn-cs"/>
+              </a:defRPr>
+            </a:lvl4pPr>
+            <a:lvl5pPr marL="1828800" algn="l" defTabSz="914400" rtl="0" eaLnBrk="1" latinLnBrk="0" hangingPunct="1">
+              <a:defRPr sz="1800" kern="1200">
+                <a:solidFill>
+                  <a:schemeClr val="tx1"/>
+                </a:solidFill>
+                <a:latin typeface="+mn-lt"/>
+                <a:ea typeface="+mn-ea"/>
+                <a:cs typeface="+mn-cs"/>
+              </a:defRPr>
+            </a:lvl5pPr>
+            <a:lvl6pPr marL="2286000" algn="l" defTabSz="914400" rtl="0" eaLnBrk="1" latinLnBrk="0" hangingPunct="1">
+              <a:defRPr sz="1800" kern="1200">
+                <a:solidFill>
+                  <a:schemeClr val="tx1"/>
+                </a:solidFill>
+                <a:latin typeface="+mn-lt"/>
+                <a:ea typeface="+mn-ea"/>
+                <a:cs typeface="+mn-cs"/>
+              </a:defRPr>
+            </a:lvl6pPr>
+            <a:lvl7pPr marL="2743200" algn="l" defTabSz="914400" rtl="0" eaLnBrk="1" latinLnBrk="0" hangingPunct="1">
+              <a:defRPr sz="1800" kern="1200">
+                <a:solidFill>
+                  <a:schemeClr val="tx1"/>
+                </a:solidFill>
+                <a:latin typeface="+mn-lt"/>
+                <a:ea typeface="+mn-ea"/>
+                <a:cs typeface="+mn-cs"/>
+              </a:defRPr>
+            </a:lvl7pPr>
+            <a:lvl8pPr marL="3200400" algn="l" defTabSz="914400" rtl="0" eaLnBrk="1" latinLnBrk="0" hangingPunct="1">
+              <a:defRPr sz="1800" kern="1200">
+                <a:solidFill>
+                  <a:schemeClr val="tx1"/>
+                </a:solidFill>
+                <a:latin typeface="+mn-lt"/>
+                <a:ea typeface="+mn-ea"/>
+                <a:cs typeface="+mn-cs"/>
+              </a:defRPr>
+            </a:lvl8pPr>
+            <a:lvl9pPr marL="3657600" algn="l" defTabSz="914400" rtl="0" eaLnBrk="1" latinLnBrk="0" hangingPunct="1">
+              <a:defRPr sz="1800" kern="1200">
+                <a:solidFill>
+                  <a:schemeClr val="tx1"/>
+                </a:solidFill>
+                <a:latin typeface="+mn-lt"/>
+                <a:ea typeface="+mn-ea"/>
+                <a:cs typeface="+mn-cs"/>
+              </a:defRPr>
+            </a:lvl9pPr>
+          </a:lstStyle>
+          <a:p>
+            <a:fld id="{A784A474-F8F9-4DC5-8AFE-6638820E2D4C}" type="slidenum">
+              <a:rPr lang="ru-RU" smtClean="0"/>
+              <a:pPr/>
+              <a:t>9</a:t>
+            </a:fld>
+            <a:endParaRPr lang="ru-RU" dirty="0">
+              <a:solidFill>
+                <a:srgbClr val="000000"/>
+              </a:solidFill>
+              <a:latin typeface="Times New Roman"/>
+            </a:endParaRPr>
+          </a:p>
+        </p:txBody>
+      </p:sp>
+      <p:pic>
+        <p:nvPicPr>
+          <p:cNvPr id="4" name="Рисунок 3">
+            <a:extLst>
+              <a:ext uri="{FF2B5EF4-FFF2-40B4-BE49-F238E27FC236}">
+                <a16:creationId xmlns:a16="http://schemas.microsoft.com/office/drawing/2014/main" id="{C7712F22-9C22-41BA-80E5-DDC49219E1EA}"/>
+              </a:ext>
+            </a:extLst>
+          </p:cNvPr>
+          <p:cNvPicPr/>
+          <p:nvPr/>
+        </p:nvPicPr>
+        <p:blipFill>
+          <a:blip r:embed="rId2" cstate="print">
+            <a:extLst>
+              <a:ext uri="{28A0092B-C50C-407E-A947-70E740481C1C}">
+                <a14:useLocalDpi xmlns:a14="http://schemas.microsoft.com/office/drawing/2010/main" val="0"/>
+              </a:ext>
+            </a:extLst>
+          </a:blip>
+          <a:srcRect/>
+          <a:stretch>
+            <a:fillRect/>
+          </a:stretch>
+        </p:blipFill>
+        <p:spPr bwMode="auto">
+          <a:xfrm>
+            <a:off x="0" y="775080"/>
+            <a:ext cx="3160775" cy="4063854"/>
+          </a:xfrm>
+          <a:prstGeom prst="rect">
+            <a:avLst/>
+          </a:prstGeom>
+          <a:noFill/>
+          <a:ln>
+            <a:noFill/>
+          </a:ln>
+        </p:spPr>
+      </p:pic>
+      <p:pic>
+        <p:nvPicPr>
+          <p:cNvPr id="5" name="Рисунок 4">
+            <a:extLst>
+              <a:ext uri="{FF2B5EF4-FFF2-40B4-BE49-F238E27FC236}">
+                <a16:creationId xmlns:a16="http://schemas.microsoft.com/office/drawing/2014/main" id="{9D3ACC5E-B4A2-4481-A382-D3960E39C11D}"/>
+              </a:ext>
+            </a:extLst>
+          </p:cNvPr>
+          <p:cNvPicPr/>
+          <p:nvPr/>
+        </p:nvPicPr>
+        <p:blipFill>
+          <a:blip r:embed="rId3" cstate="print">
+            <a:extLst>
+              <a:ext uri="{28A0092B-C50C-407E-A947-70E740481C1C}">
+                <a14:useLocalDpi xmlns:a14="http://schemas.microsoft.com/office/drawing/2010/main" val="0"/>
+              </a:ext>
+            </a:extLst>
+          </a:blip>
+          <a:srcRect/>
+          <a:stretch>
+            <a:fillRect/>
+          </a:stretch>
+        </p:blipFill>
+        <p:spPr bwMode="auto">
+          <a:xfrm>
+            <a:off x="2300109" y="864609"/>
+            <a:ext cx="1732804" cy="3978167"/>
+          </a:xfrm>
+          <a:prstGeom prst="rect">
+            <a:avLst/>
+          </a:prstGeom>
+          <a:noFill/>
+          <a:ln>
+            <a:noFill/>
+          </a:ln>
+        </p:spPr>
+      </p:pic>
+      <p:pic>
+        <p:nvPicPr>
+          <p:cNvPr id="6" name="Рисунок 5">
+            <a:extLst>
+              <a:ext uri="{FF2B5EF4-FFF2-40B4-BE49-F238E27FC236}">
+                <a16:creationId xmlns:a16="http://schemas.microsoft.com/office/drawing/2014/main" id="{811C3EAA-631E-4C3A-830E-FD1DBB55D66F}"/>
+              </a:ext>
+            </a:extLst>
+          </p:cNvPr>
+          <p:cNvPicPr/>
+          <p:nvPr/>
+        </p:nvPicPr>
+        <p:blipFill>
+          <a:blip r:embed="rId4">
+            <a:extLst>
+              <a:ext uri="{28A0092B-C50C-407E-A947-70E740481C1C}">
+                <a14:useLocalDpi xmlns:a14="http://schemas.microsoft.com/office/drawing/2010/main" val="0"/>
+              </a:ext>
+            </a:extLst>
+          </a:blip>
+          <a:srcRect/>
+          <a:stretch>
+            <a:fillRect/>
+          </a:stretch>
+        </p:blipFill>
+        <p:spPr bwMode="auto">
+          <a:xfrm>
+            <a:off x="4162315" y="1230050"/>
+            <a:ext cx="4541765" cy="3247283"/>
+          </a:xfrm>
+          <a:prstGeom prst="rect">
+            <a:avLst/>
+          </a:prstGeom>
+          <a:noFill/>
+          <a:ln>
+            <a:noFill/>
+          </a:ln>
+        </p:spPr>
+      </p:pic>
+    </p:spTree>
+    <p:extLst>
+      <p:ext uri="{BB962C8B-B14F-4D97-AF65-F5344CB8AC3E}">
+        <p14:creationId xmlns:p14="http://schemas.microsoft.com/office/powerpoint/2010/main" val="23770044"/>
+      </p:ext>
+    </p:extLst>
   </p:cSld>
   <p:clrMapOvr>
     <a:masterClrMapping/>

</xml_diff>